<commit_message>
add batch overview image tasks to build tool jars
</commit_message>
<xml_diff>
--- a/doc/figures.pptx
+++ b/doc/figures.pptx
@@ -6,6 +6,7 @@
   </p:sldMasterIdLst>
   <p:sldIdLst>
     <p:sldId id="256" r:id="rId2"/>
+    <p:sldId id="257" r:id="rId3"/>
   </p:sldIdLst>
   <p:sldSz cx="12192000" cy="6858000"/>
   <p:notesSz cx="6858000" cy="9144000"/>
@@ -104,6 +105,11 @@
       </a:defRPr>
     </a:lvl9pPr>
   </p:defaultTextStyle>
+  <p:extLst>
+    <p:ext uri="{EFAFB233-063F-42B5-8137-9DF3F51BA10A}">
+      <p15:sldGuideLst xmlns:p15="http://schemas.microsoft.com/office/powerpoint/2012/main"/>
+    </p:ext>
+  </p:extLst>
 </p:presentation>
 </file>
 
@@ -256,7 +262,7 @@
           <a:p>
             <a:fld id="{F36CA848-63D9-472F-B641-DA0BAA5239E6}" type="datetimeFigureOut">
               <a:rPr lang="en-US" smtClean="0"/>
-              <a:t>11/26/2019</a:t>
+              <a:t>2/13/2020</a:t>
             </a:fld>
             <a:endParaRPr lang="en-US"/>
           </a:p>
@@ -456,7 +462,7 @@
           <a:p>
             <a:fld id="{F36CA848-63D9-472F-B641-DA0BAA5239E6}" type="datetimeFigureOut">
               <a:rPr lang="en-US" smtClean="0"/>
-              <a:t>11/26/2019</a:t>
+              <a:t>2/13/2020</a:t>
             </a:fld>
             <a:endParaRPr lang="en-US"/>
           </a:p>
@@ -666,7 +672,7 @@
           <a:p>
             <a:fld id="{F36CA848-63D9-472F-B641-DA0BAA5239E6}" type="datetimeFigureOut">
               <a:rPr lang="en-US" smtClean="0"/>
-              <a:t>11/26/2019</a:t>
+              <a:t>2/13/2020</a:t>
             </a:fld>
             <a:endParaRPr lang="en-US"/>
           </a:p>
@@ -866,7 +872,7 @@
           <a:p>
             <a:fld id="{F36CA848-63D9-472F-B641-DA0BAA5239E6}" type="datetimeFigureOut">
               <a:rPr lang="en-US" smtClean="0"/>
-              <a:t>11/26/2019</a:t>
+              <a:t>2/13/2020</a:t>
             </a:fld>
             <a:endParaRPr lang="en-US"/>
           </a:p>
@@ -1142,7 +1148,7 @@
           <a:p>
             <a:fld id="{F36CA848-63D9-472F-B641-DA0BAA5239E6}" type="datetimeFigureOut">
               <a:rPr lang="en-US" smtClean="0"/>
-              <a:t>11/26/2019</a:t>
+              <a:t>2/13/2020</a:t>
             </a:fld>
             <a:endParaRPr lang="en-US"/>
           </a:p>
@@ -1410,7 +1416,7 @@
           <a:p>
             <a:fld id="{F36CA848-63D9-472F-B641-DA0BAA5239E6}" type="datetimeFigureOut">
               <a:rPr lang="en-US" smtClean="0"/>
-              <a:t>11/26/2019</a:t>
+              <a:t>2/13/2020</a:t>
             </a:fld>
             <a:endParaRPr lang="en-US"/>
           </a:p>
@@ -1825,7 +1831,7 @@
           <a:p>
             <a:fld id="{F36CA848-63D9-472F-B641-DA0BAA5239E6}" type="datetimeFigureOut">
               <a:rPr lang="en-US" smtClean="0"/>
-              <a:t>11/26/2019</a:t>
+              <a:t>2/13/2020</a:t>
             </a:fld>
             <a:endParaRPr lang="en-US"/>
           </a:p>
@@ -1967,7 +1973,7 @@
           <a:p>
             <a:fld id="{F36CA848-63D9-472F-B641-DA0BAA5239E6}" type="datetimeFigureOut">
               <a:rPr lang="en-US" smtClean="0"/>
-              <a:t>11/26/2019</a:t>
+              <a:t>2/13/2020</a:t>
             </a:fld>
             <a:endParaRPr lang="en-US"/>
           </a:p>
@@ -2080,7 +2086,7 @@
           <a:p>
             <a:fld id="{F36CA848-63D9-472F-B641-DA0BAA5239E6}" type="datetimeFigureOut">
               <a:rPr lang="en-US" smtClean="0"/>
-              <a:t>11/26/2019</a:t>
+              <a:t>2/13/2020</a:t>
             </a:fld>
             <a:endParaRPr lang="en-US"/>
           </a:p>
@@ -2393,7 +2399,7 @@
           <a:p>
             <a:fld id="{F36CA848-63D9-472F-B641-DA0BAA5239E6}" type="datetimeFigureOut">
               <a:rPr lang="en-US" smtClean="0"/>
-              <a:t>11/26/2019</a:t>
+              <a:t>2/13/2020</a:t>
             </a:fld>
             <a:endParaRPr lang="en-US"/>
           </a:p>
@@ -2682,7 +2688,7 @@
           <a:p>
             <a:fld id="{F36CA848-63D9-472F-B641-DA0BAA5239E6}" type="datetimeFigureOut">
               <a:rPr lang="en-US" smtClean="0"/>
-              <a:t>11/26/2019</a:t>
+              <a:t>2/13/2020</a:t>
             </a:fld>
             <a:endParaRPr lang="en-US"/>
           </a:p>
@@ -2925,7 +2931,7 @@
           <a:p>
             <a:fld id="{F36CA848-63D9-472F-B641-DA0BAA5239E6}" type="datetimeFigureOut">
               <a:rPr lang="en-US" smtClean="0"/>
-              <a:t>11/26/2019</a:t>
+              <a:t>2/13/2020</a:t>
             </a:fld>
             <a:endParaRPr lang="en-US"/>
           </a:p>
@@ -4373,6 +4379,1445 @@
 </p:sld>
 </file>
 
+<file path=ppt/slides/slide2.xml><?xml version="1.0" encoding="utf-8"?>
+<p:sld xmlns:a="http://schemas.openxmlformats.org/drawingml/2006/main" xmlns:r="http://schemas.openxmlformats.org/officeDocument/2006/relationships" xmlns:p="http://schemas.openxmlformats.org/presentationml/2006/main">
+  <p:cSld>
+    <p:spTree>
+      <p:nvGrpSpPr>
+        <p:cNvPr id="1" name=""/>
+        <p:cNvGrpSpPr/>
+        <p:nvPr/>
+      </p:nvGrpSpPr>
+      <p:grpSpPr>
+        <a:xfrm>
+          <a:off x="0" y="0"/>
+          <a:ext cx="0" cy="0"/>
+          <a:chOff x="0" y="0"/>
+          <a:chExt cx="0" cy="0"/>
+        </a:xfrm>
+      </p:grpSpPr>
+      <p:sp>
+        <p:nvSpPr>
+          <p:cNvPr id="4" name="Rechteck 3">
+            <a:extLst>
+              <a:ext uri="{FF2B5EF4-FFF2-40B4-BE49-F238E27FC236}">
+                <a16:creationId xmlns:a16="http://schemas.microsoft.com/office/drawing/2014/main" id="{AA45C57D-DD49-4211-8556-4EB6B20D97E7}"/>
+              </a:ext>
+            </a:extLst>
+          </p:cNvPr>
+          <p:cNvSpPr/>
+          <p:nvPr/>
+        </p:nvSpPr>
+        <p:spPr>
+          <a:xfrm>
+            <a:off x="2187290" y="810117"/>
+            <a:ext cx="1991834" cy="787479"/>
+          </a:xfrm>
+          <a:prstGeom prst="rect">
+            <a:avLst/>
+          </a:prstGeom>
+          <a:solidFill>
+            <a:schemeClr val="bg1"/>
+          </a:solidFill>
+          <a:ln w="50800">
+            <a:solidFill>
+              <a:schemeClr val="tx1"/>
+            </a:solidFill>
+          </a:ln>
+        </p:spPr>
+        <p:style>
+          <a:lnRef idx="2">
+            <a:schemeClr val="accent1">
+              <a:shade val="50000"/>
+            </a:schemeClr>
+          </a:lnRef>
+          <a:fillRef idx="1">
+            <a:schemeClr val="accent1"/>
+          </a:fillRef>
+          <a:effectRef idx="0">
+            <a:schemeClr val="accent1"/>
+          </a:effectRef>
+          <a:fontRef idx="minor">
+            <a:schemeClr val="lt1"/>
+          </a:fontRef>
+        </p:style>
+        <p:txBody>
+          <a:bodyPr rtlCol="0" anchor="ctr"/>
+          <a:lstStyle/>
+          <a:p>
+            <a:pPr algn="ctr"/>
+            <a:r>
+              <a:rPr lang="en-US" sz="2000" b="1" dirty="0" err="1">
+                <a:solidFill>
+                  <a:schemeClr val="tx1"/>
+                </a:solidFill>
+              </a:rPr>
+              <a:t>MatchingTool</a:t>
+            </a:r>
+            <a:endParaRPr lang="en-US" sz="2000" b="1" dirty="0">
+              <a:solidFill>
+                <a:schemeClr val="tx1"/>
+              </a:solidFill>
+            </a:endParaRPr>
+          </a:p>
+        </p:txBody>
+      </p:sp>
+      <p:sp>
+        <p:nvSpPr>
+          <p:cNvPr id="6" name="Rechteck 5">
+            <a:extLst>
+              <a:ext uri="{FF2B5EF4-FFF2-40B4-BE49-F238E27FC236}">
+                <a16:creationId xmlns:a16="http://schemas.microsoft.com/office/drawing/2014/main" id="{3BFD4F07-7A8D-4898-87A2-F09FB0ACC0C1}"/>
+              </a:ext>
+            </a:extLst>
+          </p:cNvPr>
+          <p:cNvSpPr/>
+          <p:nvPr/>
+        </p:nvSpPr>
+        <p:spPr>
+          <a:xfrm>
+            <a:off x="927682" y="4404368"/>
+            <a:ext cx="1991834" cy="787479"/>
+          </a:xfrm>
+          <a:prstGeom prst="rect">
+            <a:avLst/>
+          </a:prstGeom>
+          <a:solidFill>
+            <a:schemeClr val="bg1"/>
+          </a:solidFill>
+          <a:ln w="50800">
+            <a:solidFill>
+              <a:schemeClr val="tx1"/>
+            </a:solidFill>
+          </a:ln>
+        </p:spPr>
+        <p:style>
+          <a:lnRef idx="2">
+            <a:schemeClr val="accent1">
+              <a:shade val="50000"/>
+            </a:schemeClr>
+          </a:lnRef>
+          <a:fillRef idx="1">
+            <a:schemeClr val="accent1"/>
+          </a:fillRef>
+          <a:effectRef idx="0">
+            <a:schemeClr val="accent1"/>
+          </a:effectRef>
+          <a:fontRef idx="minor">
+            <a:schemeClr val="lt1"/>
+          </a:fontRef>
+        </p:style>
+        <p:txBody>
+          <a:bodyPr rtlCol="0" anchor="ctr"/>
+          <a:lstStyle/>
+          <a:p>
+            <a:pPr algn="ctr"/>
+            <a:r>
+              <a:rPr lang="en-US" sz="3000" b="1" dirty="0">
+                <a:solidFill>
+                  <a:schemeClr val="tx1"/>
+                </a:solidFill>
+              </a:rPr>
+              <a:t>Worker</a:t>
+            </a:r>
+          </a:p>
+        </p:txBody>
+      </p:sp>
+      <p:sp>
+        <p:nvSpPr>
+          <p:cNvPr id="7" name="Rechteck 6">
+            <a:extLst>
+              <a:ext uri="{FF2B5EF4-FFF2-40B4-BE49-F238E27FC236}">
+                <a16:creationId xmlns:a16="http://schemas.microsoft.com/office/drawing/2014/main" id="{CF6D7632-3CC3-48FA-8623-1FF478A62D46}"/>
+              </a:ext>
+            </a:extLst>
+          </p:cNvPr>
+          <p:cNvSpPr/>
+          <p:nvPr/>
+        </p:nvSpPr>
+        <p:spPr>
+          <a:xfrm>
+            <a:off x="6020682" y="4404368"/>
+            <a:ext cx="1991834" cy="787479"/>
+          </a:xfrm>
+          <a:prstGeom prst="rect">
+            <a:avLst/>
+          </a:prstGeom>
+          <a:solidFill>
+            <a:schemeClr val="bg1"/>
+          </a:solidFill>
+          <a:ln w="50800">
+            <a:solidFill>
+              <a:schemeClr val="tx1"/>
+            </a:solidFill>
+          </a:ln>
+        </p:spPr>
+        <p:style>
+          <a:lnRef idx="2">
+            <a:schemeClr val="accent1">
+              <a:shade val="50000"/>
+            </a:schemeClr>
+          </a:lnRef>
+          <a:fillRef idx="1">
+            <a:schemeClr val="accent1"/>
+          </a:fillRef>
+          <a:effectRef idx="0">
+            <a:schemeClr val="accent1"/>
+          </a:effectRef>
+          <a:fontRef idx="minor">
+            <a:schemeClr val="lt1"/>
+          </a:fontRef>
+        </p:style>
+        <p:txBody>
+          <a:bodyPr rtlCol="0" anchor="ctr"/>
+          <a:lstStyle/>
+          <a:p>
+            <a:pPr algn="ctr"/>
+            <a:r>
+              <a:rPr lang="en-US" sz="3000" b="1" dirty="0">
+                <a:solidFill>
+                  <a:schemeClr val="tx1"/>
+                </a:solidFill>
+              </a:rPr>
+              <a:t>Worker</a:t>
+            </a:r>
+          </a:p>
+        </p:txBody>
+      </p:sp>
+      <p:sp>
+        <p:nvSpPr>
+          <p:cNvPr id="8" name="Rechteck 7">
+            <a:extLst>
+              <a:ext uri="{FF2B5EF4-FFF2-40B4-BE49-F238E27FC236}">
+                <a16:creationId xmlns:a16="http://schemas.microsoft.com/office/drawing/2014/main" id="{A624305E-2535-4145-80E0-E967FD4FC6F1}"/>
+              </a:ext>
+            </a:extLst>
+          </p:cNvPr>
+          <p:cNvSpPr/>
+          <p:nvPr/>
+        </p:nvSpPr>
+        <p:spPr>
+          <a:xfrm>
+            <a:off x="3474182" y="4404369"/>
+            <a:ext cx="1991834" cy="787479"/>
+          </a:xfrm>
+          <a:prstGeom prst="rect">
+            <a:avLst/>
+          </a:prstGeom>
+          <a:solidFill>
+            <a:schemeClr val="bg1"/>
+          </a:solidFill>
+          <a:ln w="50800">
+            <a:solidFill>
+              <a:schemeClr val="tx1"/>
+            </a:solidFill>
+          </a:ln>
+        </p:spPr>
+        <p:style>
+          <a:lnRef idx="2">
+            <a:schemeClr val="accent1">
+              <a:shade val="50000"/>
+            </a:schemeClr>
+          </a:lnRef>
+          <a:fillRef idx="1">
+            <a:schemeClr val="accent1"/>
+          </a:fillRef>
+          <a:effectRef idx="0">
+            <a:schemeClr val="accent1"/>
+          </a:effectRef>
+          <a:fontRef idx="minor">
+            <a:schemeClr val="lt1"/>
+          </a:fontRef>
+        </p:style>
+        <p:txBody>
+          <a:bodyPr rtlCol="0" anchor="ctr"/>
+          <a:lstStyle/>
+          <a:p>
+            <a:pPr algn="ctr"/>
+            <a:r>
+              <a:rPr lang="en-US" sz="3000" b="1" dirty="0">
+                <a:solidFill>
+                  <a:schemeClr val="tx1"/>
+                </a:solidFill>
+              </a:rPr>
+              <a:t>Worker</a:t>
+            </a:r>
+          </a:p>
+        </p:txBody>
+      </p:sp>
+      <p:sp>
+        <p:nvSpPr>
+          <p:cNvPr id="11" name="Ellipse 10">
+            <a:extLst>
+              <a:ext uri="{FF2B5EF4-FFF2-40B4-BE49-F238E27FC236}">
+                <a16:creationId xmlns:a16="http://schemas.microsoft.com/office/drawing/2014/main" id="{5AD7F7F9-8D32-4161-BA33-C551305F4F45}"/>
+              </a:ext>
+            </a:extLst>
+          </p:cNvPr>
+          <p:cNvSpPr/>
+          <p:nvPr/>
+        </p:nvSpPr>
+        <p:spPr>
+          <a:xfrm>
+            <a:off x="3411273" y="5829302"/>
+            <a:ext cx="2117653" cy="587446"/>
+          </a:xfrm>
+          <a:prstGeom prst="ellipse">
+            <a:avLst/>
+          </a:prstGeom>
+          <a:solidFill>
+            <a:schemeClr val="bg1"/>
+          </a:solidFill>
+          <a:ln w="50800">
+            <a:solidFill>
+              <a:schemeClr val="tx1"/>
+            </a:solidFill>
+          </a:ln>
+        </p:spPr>
+        <p:style>
+          <a:lnRef idx="2">
+            <a:schemeClr val="accent1">
+              <a:shade val="50000"/>
+            </a:schemeClr>
+          </a:lnRef>
+          <a:fillRef idx="1">
+            <a:schemeClr val="accent1"/>
+          </a:fillRef>
+          <a:effectRef idx="0">
+            <a:schemeClr val="accent1"/>
+          </a:effectRef>
+          <a:fontRef idx="minor">
+            <a:schemeClr val="lt1"/>
+          </a:fontRef>
+        </p:style>
+        <p:txBody>
+          <a:bodyPr rtlCol="0" anchor="ctr"/>
+          <a:lstStyle/>
+          <a:p>
+            <a:pPr algn="ctr"/>
+            <a:r>
+              <a:rPr lang="en-US" sz="3000" b="1" dirty="0">
+                <a:solidFill>
+                  <a:schemeClr val="tx1"/>
+                </a:solidFill>
+              </a:rPr>
+              <a:t>SUT</a:t>
+            </a:r>
+          </a:p>
+        </p:txBody>
+      </p:sp>
+      <p:cxnSp>
+        <p:nvCxnSpPr>
+          <p:cNvPr id="17" name="Gerade Verbindung mit Pfeil 16">
+            <a:extLst>
+              <a:ext uri="{FF2B5EF4-FFF2-40B4-BE49-F238E27FC236}">
+                <a16:creationId xmlns:a16="http://schemas.microsoft.com/office/drawing/2014/main" id="{454A54FF-872A-4CE6-94A4-B8FE578663A1}"/>
+              </a:ext>
+            </a:extLst>
+          </p:cNvPr>
+          <p:cNvCxnSpPr>
+            <a:cxnSpLocks/>
+            <a:stCxn id="8" idx="0"/>
+            <a:endCxn id="24" idx="2"/>
+          </p:cNvCxnSpPr>
+          <p:nvPr/>
+        </p:nvCxnSpPr>
+        <p:spPr>
+          <a:xfrm rot="16200000" flipV="1">
+            <a:off x="3414457" y="3348727"/>
+            <a:ext cx="824392" cy="1286892"/>
+          </a:xfrm>
+          <a:prstGeom prst="bentConnector3">
+            <a:avLst>
+              <a:gd name="adj1" fmla="val 50000"/>
+            </a:avLst>
+          </a:prstGeom>
+          <a:ln w="50800">
+            <a:solidFill>
+              <a:schemeClr val="tx1"/>
+            </a:solidFill>
+            <a:headEnd type="triangle"/>
+            <a:tailEnd type="triangle"/>
+          </a:ln>
+        </p:spPr>
+        <p:style>
+          <a:lnRef idx="1">
+            <a:schemeClr val="accent1"/>
+          </a:lnRef>
+          <a:fillRef idx="0">
+            <a:schemeClr val="accent1"/>
+          </a:fillRef>
+          <a:effectRef idx="0">
+            <a:schemeClr val="accent1"/>
+          </a:effectRef>
+          <a:fontRef idx="minor">
+            <a:schemeClr val="tx1"/>
+          </a:fontRef>
+        </p:style>
+      </p:cxnSp>
+      <p:cxnSp>
+        <p:nvCxnSpPr>
+          <p:cNvPr id="20" name="Gerade Verbindung mit Pfeil 19">
+            <a:extLst>
+              <a:ext uri="{FF2B5EF4-FFF2-40B4-BE49-F238E27FC236}">
+                <a16:creationId xmlns:a16="http://schemas.microsoft.com/office/drawing/2014/main" id="{00FADB33-6E61-40A3-ABE4-65C779C9F5DD}"/>
+              </a:ext>
+            </a:extLst>
+          </p:cNvPr>
+          <p:cNvCxnSpPr>
+            <a:cxnSpLocks/>
+          </p:cNvCxnSpPr>
+          <p:nvPr/>
+        </p:nvCxnSpPr>
+        <p:spPr>
+          <a:xfrm flipH="1" flipV="1">
+            <a:off x="4470099" y="5191848"/>
+            <a:ext cx="1" cy="637454"/>
+          </a:xfrm>
+          <a:prstGeom prst="straightConnector1">
+            <a:avLst/>
+          </a:prstGeom>
+          <a:ln w="50800">
+            <a:solidFill>
+              <a:schemeClr val="tx1"/>
+            </a:solidFill>
+            <a:headEnd type="triangle"/>
+            <a:tailEnd type="triangle"/>
+          </a:ln>
+        </p:spPr>
+        <p:style>
+          <a:lnRef idx="1">
+            <a:schemeClr val="accent1"/>
+          </a:lnRef>
+          <a:fillRef idx="0">
+            <a:schemeClr val="accent1"/>
+          </a:fillRef>
+          <a:effectRef idx="0">
+            <a:schemeClr val="accent1"/>
+          </a:effectRef>
+          <a:fontRef idx="minor">
+            <a:schemeClr val="tx1"/>
+          </a:fontRef>
+        </p:style>
+      </p:cxnSp>
+      <p:cxnSp>
+        <p:nvCxnSpPr>
+          <p:cNvPr id="23" name="Gerade Verbindung mit Pfeil 22">
+            <a:extLst>
+              <a:ext uri="{FF2B5EF4-FFF2-40B4-BE49-F238E27FC236}">
+                <a16:creationId xmlns:a16="http://schemas.microsoft.com/office/drawing/2014/main" id="{E30EE955-6C3A-4E6C-8AD0-60CDEAC50870}"/>
+              </a:ext>
+            </a:extLst>
+          </p:cNvPr>
+          <p:cNvCxnSpPr>
+            <a:cxnSpLocks/>
+            <a:stCxn id="7" idx="0"/>
+            <a:endCxn id="24" idx="2"/>
+          </p:cNvCxnSpPr>
+          <p:nvPr/>
+        </p:nvCxnSpPr>
+        <p:spPr>
+          <a:xfrm rot="16200000" flipV="1">
+            <a:off x="4687708" y="2075477"/>
+            <a:ext cx="824391" cy="3833392"/>
+          </a:xfrm>
+          <a:prstGeom prst="bentConnector3">
+            <a:avLst>
+              <a:gd name="adj1" fmla="val 50000"/>
+            </a:avLst>
+          </a:prstGeom>
+          <a:ln w="50800">
+            <a:solidFill>
+              <a:schemeClr val="tx1"/>
+            </a:solidFill>
+            <a:headEnd type="triangle"/>
+            <a:tailEnd type="triangle"/>
+          </a:ln>
+        </p:spPr>
+        <p:style>
+          <a:lnRef idx="1">
+            <a:schemeClr val="accent1"/>
+          </a:lnRef>
+          <a:fillRef idx="0">
+            <a:schemeClr val="accent1"/>
+          </a:fillRef>
+          <a:effectRef idx="0">
+            <a:schemeClr val="accent1"/>
+          </a:effectRef>
+          <a:fontRef idx="minor">
+            <a:schemeClr val="tx1"/>
+          </a:fontRef>
+        </p:style>
+      </p:cxnSp>
+      <p:cxnSp>
+        <p:nvCxnSpPr>
+          <p:cNvPr id="28" name="Gerade Verbindung mit Pfeil 22">
+            <a:extLst>
+              <a:ext uri="{FF2B5EF4-FFF2-40B4-BE49-F238E27FC236}">
+                <a16:creationId xmlns:a16="http://schemas.microsoft.com/office/drawing/2014/main" id="{F543CDAC-54DD-4AD1-906D-DCEFBF3CC233}"/>
+              </a:ext>
+            </a:extLst>
+          </p:cNvPr>
+          <p:cNvCxnSpPr>
+            <a:cxnSpLocks/>
+            <a:stCxn id="6" idx="0"/>
+            <a:endCxn id="24" idx="2"/>
+          </p:cNvCxnSpPr>
+          <p:nvPr/>
+        </p:nvCxnSpPr>
+        <p:spPr>
+          <a:xfrm rot="5400000" flipH="1" flipV="1">
+            <a:off x="2141208" y="3362369"/>
+            <a:ext cx="824391" cy="1259608"/>
+          </a:xfrm>
+          <a:prstGeom prst="bentConnector3">
+            <a:avLst>
+              <a:gd name="adj1" fmla="val 50000"/>
+            </a:avLst>
+          </a:prstGeom>
+          <a:ln w="50800">
+            <a:solidFill>
+              <a:schemeClr val="tx1"/>
+            </a:solidFill>
+            <a:headEnd type="triangle"/>
+            <a:tailEnd type="triangle"/>
+          </a:ln>
+        </p:spPr>
+        <p:style>
+          <a:lnRef idx="1">
+            <a:schemeClr val="accent1"/>
+          </a:lnRef>
+          <a:fillRef idx="0">
+            <a:schemeClr val="accent1"/>
+          </a:fillRef>
+          <a:effectRef idx="0">
+            <a:schemeClr val="accent1"/>
+          </a:effectRef>
+          <a:fontRef idx="minor">
+            <a:schemeClr val="tx1"/>
+          </a:fontRef>
+        </p:style>
+      </p:cxnSp>
+      <p:cxnSp>
+        <p:nvCxnSpPr>
+          <p:cNvPr id="31" name="Gerade Verbindung mit Pfeil 22">
+            <a:extLst>
+              <a:ext uri="{FF2B5EF4-FFF2-40B4-BE49-F238E27FC236}">
+                <a16:creationId xmlns:a16="http://schemas.microsoft.com/office/drawing/2014/main" id="{CC97DD0C-B8E3-4592-B3F8-E9FAF6164706}"/>
+              </a:ext>
+            </a:extLst>
+          </p:cNvPr>
+          <p:cNvCxnSpPr>
+            <a:cxnSpLocks/>
+            <a:stCxn id="6" idx="2"/>
+            <a:endCxn id="11" idx="2"/>
+          </p:cNvCxnSpPr>
+          <p:nvPr/>
+        </p:nvCxnSpPr>
+        <p:spPr>
+          <a:xfrm rot="16200000" flipH="1">
+            <a:off x="2201847" y="4913599"/>
+            <a:ext cx="931178" cy="1487674"/>
+          </a:xfrm>
+          <a:prstGeom prst="bentConnector2">
+            <a:avLst/>
+          </a:prstGeom>
+          <a:ln w="50800">
+            <a:solidFill>
+              <a:schemeClr val="tx1"/>
+            </a:solidFill>
+            <a:headEnd type="triangle"/>
+            <a:tailEnd type="triangle"/>
+          </a:ln>
+        </p:spPr>
+        <p:style>
+          <a:lnRef idx="1">
+            <a:schemeClr val="accent1"/>
+          </a:lnRef>
+          <a:fillRef idx="0">
+            <a:schemeClr val="accent1"/>
+          </a:fillRef>
+          <a:effectRef idx="0">
+            <a:schemeClr val="accent1"/>
+          </a:effectRef>
+          <a:fontRef idx="minor">
+            <a:schemeClr val="tx1"/>
+          </a:fontRef>
+        </p:style>
+      </p:cxnSp>
+      <p:cxnSp>
+        <p:nvCxnSpPr>
+          <p:cNvPr id="34" name="Gerade Verbindung mit Pfeil 22">
+            <a:extLst>
+              <a:ext uri="{FF2B5EF4-FFF2-40B4-BE49-F238E27FC236}">
+                <a16:creationId xmlns:a16="http://schemas.microsoft.com/office/drawing/2014/main" id="{4D524FB7-EDEC-4DFA-88FE-41B2F713C964}"/>
+              </a:ext>
+            </a:extLst>
+          </p:cNvPr>
+          <p:cNvCxnSpPr>
+            <a:cxnSpLocks/>
+            <a:stCxn id="7" idx="2"/>
+            <a:endCxn id="11" idx="6"/>
+          </p:cNvCxnSpPr>
+          <p:nvPr/>
+        </p:nvCxnSpPr>
+        <p:spPr>
+          <a:xfrm rot="5400000">
+            <a:off x="5807174" y="4913600"/>
+            <a:ext cx="931178" cy="1487673"/>
+          </a:xfrm>
+          <a:prstGeom prst="bentConnector2">
+            <a:avLst/>
+          </a:prstGeom>
+          <a:ln w="50800">
+            <a:solidFill>
+              <a:schemeClr val="tx1"/>
+            </a:solidFill>
+            <a:headEnd type="triangle"/>
+            <a:tailEnd type="triangle"/>
+          </a:ln>
+        </p:spPr>
+        <p:style>
+          <a:lnRef idx="1">
+            <a:schemeClr val="accent1"/>
+          </a:lnRef>
+          <a:fillRef idx="0">
+            <a:schemeClr val="accent1"/>
+          </a:fillRef>
+          <a:effectRef idx="0">
+            <a:schemeClr val="accent1"/>
+          </a:effectRef>
+          <a:fontRef idx="minor">
+            <a:schemeClr val="tx1"/>
+          </a:fontRef>
+        </p:style>
+      </p:cxnSp>
+      <p:sp>
+        <p:nvSpPr>
+          <p:cNvPr id="38" name="Rechteck: abgerundete Ecken 37">
+            <a:extLst>
+              <a:ext uri="{FF2B5EF4-FFF2-40B4-BE49-F238E27FC236}">
+                <a16:creationId xmlns:a16="http://schemas.microsoft.com/office/drawing/2014/main" id="{D4EB0EBB-8DBA-4D6B-8254-CBDA1D749562}"/>
+              </a:ext>
+            </a:extLst>
+          </p:cNvPr>
+          <p:cNvSpPr/>
+          <p:nvPr/>
+        </p:nvSpPr>
+        <p:spPr>
+          <a:xfrm>
+            <a:off x="446562" y="321734"/>
+            <a:ext cx="8038214" cy="5132768"/>
+          </a:xfrm>
+          <a:prstGeom prst="roundRect">
+            <a:avLst/>
+          </a:prstGeom>
+          <a:noFill/>
+          <a:ln w="25400">
+            <a:solidFill>
+              <a:schemeClr val="tx1"/>
+            </a:solidFill>
+            <a:prstDash val="sysDash"/>
+          </a:ln>
+        </p:spPr>
+        <p:style>
+          <a:lnRef idx="2">
+            <a:schemeClr val="accent1">
+              <a:shade val="50000"/>
+            </a:schemeClr>
+          </a:lnRef>
+          <a:fillRef idx="1">
+            <a:schemeClr val="accent1"/>
+          </a:fillRef>
+          <a:effectRef idx="0">
+            <a:schemeClr val="accent1"/>
+          </a:effectRef>
+          <a:fontRef idx="minor">
+            <a:schemeClr val="lt1"/>
+          </a:fontRef>
+        </p:style>
+        <p:txBody>
+          <a:bodyPr rtlCol="0" anchor="ctr"/>
+          <a:lstStyle/>
+          <a:p>
+            <a:pPr algn="ctr"/>
+            <a:endParaRPr lang="en-US"/>
+          </a:p>
+        </p:txBody>
+      </p:sp>
+      <p:sp>
+        <p:nvSpPr>
+          <p:cNvPr id="100" name="Rechteck: abgerundete Ecken 99">
+            <a:extLst>
+              <a:ext uri="{FF2B5EF4-FFF2-40B4-BE49-F238E27FC236}">
+                <a16:creationId xmlns:a16="http://schemas.microsoft.com/office/drawing/2014/main" id="{DB6EBB3B-50FF-46D6-B369-7D7E75F07AEC}"/>
+              </a:ext>
+            </a:extLst>
+          </p:cNvPr>
+          <p:cNvSpPr/>
+          <p:nvPr/>
+        </p:nvSpPr>
+        <p:spPr>
+          <a:xfrm>
+            <a:off x="446562" y="5571120"/>
+            <a:ext cx="8038214" cy="1045661"/>
+          </a:xfrm>
+          <a:prstGeom prst="roundRect">
+            <a:avLst/>
+          </a:prstGeom>
+          <a:noFill/>
+          <a:ln w="25400">
+            <a:solidFill>
+              <a:schemeClr val="tx1"/>
+            </a:solidFill>
+            <a:prstDash val="sysDash"/>
+          </a:ln>
+        </p:spPr>
+        <p:style>
+          <a:lnRef idx="2">
+            <a:schemeClr val="accent1">
+              <a:shade val="50000"/>
+            </a:schemeClr>
+          </a:lnRef>
+          <a:fillRef idx="1">
+            <a:schemeClr val="accent1"/>
+          </a:fillRef>
+          <a:effectRef idx="0">
+            <a:schemeClr val="accent1"/>
+          </a:effectRef>
+          <a:fontRef idx="minor">
+            <a:schemeClr val="lt1"/>
+          </a:fontRef>
+        </p:style>
+        <p:txBody>
+          <a:bodyPr rtlCol="0" anchor="ctr"/>
+          <a:lstStyle/>
+          <a:p>
+            <a:pPr algn="ctr"/>
+            <a:endParaRPr lang="en-US"/>
+          </a:p>
+        </p:txBody>
+      </p:sp>
+      <p:sp>
+        <p:nvSpPr>
+          <p:cNvPr id="103" name="Textfeld 102">
+            <a:extLst>
+              <a:ext uri="{FF2B5EF4-FFF2-40B4-BE49-F238E27FC236}">
+                <a16:creationId xmlns:a16="http://schemas.microsoft.com/office/drawing/2014/main" id="{4F6641FC-13AE-41F6-B5CE-F9FC1B6E4043}"/>
+              </a:ext>
+            </a:extLst>
+          </p:cNvPr>
+          <p:cNvSpPr txBox="1"/>
+          <p:nvPr/>
+        </p:nvSpPr>
+        <p:spPr>
+          <a:xfrm>
+            <a:off x="8582234" y="5454501"/>
+            <a:ext cx="2698910" cy="646331"/>
+          </a:xfrm>
+          <a:prstGeom prst="rect">
+            <a:avLst/>
+          </a:prstGeom>
+          <a:noFill/>
+        </p:spPr>
+        <p:txBody>
+          <a:bodyPr wrap="square" rtlCol="0">
+            <a:spAutoFit/>
+          </a:bodyPr>
+          <a:lstStyle/>
+          <a:p>
+            <a:r>
+              <a:rPr lang="en-US" dirty="0"/>
+              <a:t>SUT and </a:t>
+            </a:r>
+            <a:r>
+              <a:rPr lang="en-US" dirty="0" err="1"/>
+              <a:t>openISBT</a:t>
+            </a:r>
+            <a:r>
+              <a:rPr lang="en-US" dirty="0"/>
+              <a:t> should run on different instances.</a:t>
+            </a:r>
+          </a:p>
+        </p:txBody>
+      </p:sp>
+      <p:sp>
+        <p:nvSpPr>
+          <p:cNvPr id="104" name="Textfeld 103">
+            <a:extLst>
+              <a:ext uri="{FF2B5EF4-FFF2-40B4-BE49-F238E27FC236}">
+                <a16:creationId xmlns:a16="http://schemas.microsoft.com/office/drawing/2014/main" id="{F31A7DD7-7C36-4835-A126-0258ABE00C78}"/>
+              </a:ext>
+            </a:extLst>
+          </p:cNvPr>
+          <p:cNvSpPr txBox="1"/>
+          <p:nvPr/>
+        </p:nvSpPr>
+        <p:spPr>
+          <a:xfrm>
+            <a:off x="8567181" y="4203498"/>
+            <a:ext cx="2235498" cy="646331"/>
+          </a:xfrm>
+          <a:prstGeom prst="rect">
+            <a:avLst/>
+          </a:prstGeom>
+          <a:noFill/>
+        </p:spPr>
+        <p:txBody>
+          <a:bodyPr wrap="square" rtlCol="0">
+            <a:spAutoFit/>
+          </a:bodyPr>
+          <a:lstStyle/>
+          <a:p>
+            <a:r>
+              <a:rPr lang="en-US" dirty="0"/>
+              <a:t>Workers can also run on other instances.</a:t>
+            </a:r>
+          </a:p>
+        </p:txBody>
+      </p:sp>
+      <p:sp>
+        <p:nvSpPr>
+          <p:cNvPr id="106" name="Textfeld 105">
+            <a:extLst>
+              <a:ext uri="{FF2B5EF4-FFF2-40B4-BE49-F238E27FC236}">
+                <a16:creationId xmlns:a16="http://schemas.microsoft.com/office/drawing/2014/main" id="{BFAA0562-8ED9-4357-A728-7D0671E6015C}"/>
+              </a:ext>
+            </a:extLst>
+          </p:cNvPr>
+          <p:cNvSpPr txBox="1"/>
+          <p:nvPr/>
+        </p:nvSpPr>
+        <p:spPr>
+          <a:xfrm>
+            <a:off x="8567181" y="2192837"/>
+            <a:ext cx="2458782" cy="923330"/>
+          </a:xfrm>
+          <a:prstGeom prst="rect">
+            <a:avLst/>
+          </a:prstGeom>
+          <a:noFill/>
+        </p:spPr>
+        <p:txBody>
+          <a:bodyPr wrap="square" rtlCol="0">
+            <a:spAutoFit/>
+          </a:bodyPr>
+          <a:lstStyle/>
+          <a:p>
+            <a:r>
+              <a:rPr lang="en-US" dirty="0"/>
+              <a:t>All </a:t>
+            </a:r>
+            <a:r>
+              <a:rPr lang="en-US" dirty="0" err="1"/>
+              <a:t>openISBT</a:t>
+            </a:r>
+            <a:r>
+              <a:rPr lang="en-US" dirty="0"/>
+              <a:t> tools can and should run on the same instance.</a:t>
+            </a:r>
+          </a:p>
+        </p:txBody>
+      </p:sp>
+      <p:sp>
+        <p:nvSpPr>
+          <p:cNvPr id="22" name="Rechteck 21">
+            <a:extLst>
+              <a:ext uri="{FF2B5EF4-FFF2-40B4-BE49-F238E27FC236}">
+                <a16:creationId xmlns:a16="http://schemas.microsoft.com/office/drawing/2014/main" id="{50033A41-24CC-42AF-8C6C-FB683038588D}"/>
+              </a:ext>
+            </a:extLst>
+          </p:cNvPr>
+          <p:cNvSpPr/>
+          <p:nvPr/>
+        </p:nvSpPr>
+        <p:spPr>
+          <a:xfrm>
+            <a:off x="5024765" y="816185"/>
+            <a:ext cx="1991834" cy="787479"/>
+          </a:xfrm>
+          <a:prstGeom prst="rect">
+            <a:avLst/>
+          </a:prstGeom>
+          <a:solidFill>
+            <a:schemeClr val="bg1"/>
+          </a:solidFill>
+          <a:ln w="50800">
+            <a:solidFill>
+              <a:schemeClr val="tx1"/>
+            </a:solidFill>
+          </a:ln>
+        </p:spPr>
+        <p:style>
+          <a:lnRef idx="2">
+            <a:schemeClr val="accent1">
+              <a:shade val="50000"/>
+            </a:schemeClr>
+          </a:lnRef>
+          <a:fillRef idx="1">
+            <a:schemeClr val="accent1"/>
+          </a:fillRef>
+          <a:effectRef idx="0">
+            <a:schemeClr val="accent1"/>
+          </a:effectRef>
+          <a:fontRef idx="minor">
+            <a:schemeClr val="lt1"/>
+          </a:fontRef>
+        </p:style>
+        <p:txBody>
+          <a:bodyPr rtlCol="0" anchor="ctr"/>
+          <a:lstStyle/>
+          <a:p>
+            <a:pPr algn="ctr"/>
+            <a:r>
+              <a:rPr lang="en-US" sz="2000" b="1" dirty="0">
+                <a:solidFill>
+                  <a:schemeClr val="tx1"/>
+                </a:solidFill>
+              </a:rPr>
+              <a:t>Workload Generator</a:t>
+            </a:r>
+          </a:p>
+        </p:txBody>
+      </p:sp>
+      <p:sp>
+        <p:nvSpPr>
+          <p:cNvPr id="24" name="Rechteck 23">
+            <a:extLst>
+              <a:ext uri="{FF2B5EF4-FFF2-40B4-BE49-F238E27FC236}">
+                <a16:creationId xmlns:a16="http://schemas.microsoft.com/office/drawing/2014/main" id="{B73AC2A5-499C-4EF4-82D7-74C2C452A0F1}"/>
+              </a:ext>
+            </a:extLst>
+          </p:cNvPr>
+          <p:cNvSpPr/>
+          <p:nvPr/>
+        </p:nvSpPr>
+        <p:spPr>
+          <a:xfrm>
+            <a:off x="2187290" y="2792498"/>
+            <a:ext cx="1991834" cy="787479"/>
+          </a:xfrm>
+          <a:prstGeom prst="rect">
+            <a:avLst/>
+          </a:prstGeom>
+          <a:solidFill>
+            <a:schemeClr val="bg1"/>
+          </a:solidFill>
+          <a:ln w="50800">
+            <a:solidFill>
+              <a:schemeClr val="tx1"/>
+            </a:solidFill>
+          </a:ln>
+        </p:spPr>
+        <p:style>
+          <a:lnRef idx="2">
+            <a:schemeClr val="accent1">
+              <a:shade val="50000"/>
+            </a:schemeClr>
+          </a:lnRef>
+          <a:fillRef idx="1">
+            <a:schemeClr val="accent1"/>
+          </a:fillRef>
+          <a:effectRef idx="0">
+            <a:schemeClr val="accent1"/>
+          </a:effectRef>
+          <a:fontRef idx="minor">
+            <a:schemeClr val="lt1"/>
+          </a:fontRef>
+        </p:style>
+        <p:txBody>
+          <a:bodyPr rtlCol="0" anchor="ctr"/>
+          <a:lstStyle/>
+          <a:p>
+            <a:pPr algn="ctr"/>
+            <a:r>
+              <a:rPr lang="en-US" sz="2000" b="1" dirty="0">
+                <a:solidFill>
+                  <a:schemeClr val="tx1"/>
+                </a:solidFill>
+              </a:rPr>
+              <a:t>Run Tool</a:t>
+            </a:r>
+          </a:p>
+        </p:txBody>
+      </p:sp>
+      <p:sp>
+        <p:nvSpPr>
+          <p:cNvPr id="25" name="Rechteck 24">
+            <a:extLst>
+              <a:ext uri="{FF2B5EF4-FFF2-40B4-BE49-F238E27FC236}">
+                <a16:creationId xmlns:a16="http://schemas.microsoft.com/office/drawing/2014/main" id="{CAAAB417-F116-420A-ABE5-8C3CA447E95F}"/>
+              </a:ext>
+            </a:extLst>
+          </p:cNvPr>
+          <p:cNvSpPr/>
+          <p:nvPr/>
+        </p:nvSpPr>
+        <p:spPr>
+          <a:xfrm>
+            <a:off x="5024765" y="2792498"/>
+            <a:ext cx="1991834" cy="787479"/>
+          </a:xfrm>
+          <a:prstGeom prst="rect">
+            <a:avLst/>
+          </a:prstGeom>
+          <a:solidFill>
+            <a:schemeClr val="bg1"/>
+          </a:solidFill>
+          <a:ln w="50800">
+            <a:solidFill>
+              <a:schemeClr val="tx1"/>
+            </a:solidFill>
+          </a:ln>
+        </p:spPr>
+        <p:style>
+          <a:lnRef idx="2">
+            <a:schemeClr val="accent1">
+              <a:shade val="50000"/>
+            </a:schemeClr>
+          </a:lnRef>
+          <a:fillRef idx="1">
+            <a:schemeClr val="accent1"/>
+          </a:fillRef>
+          <a:effectRef idx="0">
+            <a:schemeClr val="accent1"/>
+          </a:effectRef>
+          <a:fontRef idx="minor">
+            <a:schemeClr val="lt1"/>
+          </a:fontRef>
+        </p:style>
+        <p:txBody>
+          <a:bodyPr rtlCol="0" anchor="ctr"/>
+          <a:lstStyle/>
+          <a:p>
+            <a:pPr algn="ctr"/>
+            <a:r>
+              <a:rPr lang="en-US" sz="2000" b="1" dirty="0">
+                <a:solidFill>
+                  <a:schemeClr val="tx1"/>
+                </a:solidFill>
+              </a:rPr>
+              <a:t>Box Plot Values</a:t>
+            </a:r>
+          </a:p>
+        </p:txBody>
+      </p:sp>
+      <p:sp>
+        <p:nvSpPr>
+          <p:cNvPr id="27" name="Textfeld 26">
+            <a:extLst>
+              <a:ext uri="{FF2B5EF4-FFF2-40B4-BE49-F238E27FC236}">
+                <a16:creationId xmlns:a16="http://schemas.microsoft.com/office/drawing/2014/main" id="{C2888263-6FAB-493C-89FF-7CADC5F75428}"/>
+              </a:ext>
+            </a:extLst>
+          </p:cNvPr>
+          <p:cNvSpPr txBox="1"/>
+          <p:nvPr/>
+        </p:nvSpPr>
+        <p:spPr>
+          <a:xfrm>
+            <a:off x="701275" y="757997"/>
+            <a:ext cx="1537175" cy="461665"/>
+          </a:xfrm>
+          <a:prstGeom prst="rect">
+            <a:avLst/>
+          </a:prstGeom>
+          <a:noFill/>
+        </p:spPr>
+        <p:txBody>
+          <a:bodyPr wrap="square" rtlCol="0">
+            <a:spAutoFit/>
+          </a:bodyPr>
+          <a:lstStyle/>
+          <a:p>
+            <a:r>
+              <a:rPr lang="en-US" sz="1200" dirty="0" err="1"/>
+              <a:t>openAPI</a:t>
+            </a:r>
+            <a:r>
+              <a:rPr lang="en-US" sz="1200" dirty="0"/>
+              <a:t> specification</a:t>
+            </a:r>
+            <a:br>
+              <a:rPr lang="en-US" sz="1200" dirty="0"/>
+            </a:br>
+            <a:r>
+              <a:rPr lang="en-US" sz="1200" dirty="0"/>
+              <a:t>Pattern definition</a:t>
+            </a:r>
+          </a:p>
+        </p:txBody>
+      </p:sp>
+      <p:sp>
+        <p:nvSpPr>
+          <p:cNvPr id="30" name="Textfeld 29">
+            <a:extLst>
+              <a:ext uri="{FF2B5EF4-FFF2-40B4-BE49-F238E27FC236}">
+                <a16:creationId xmlns:a16="http://schemas.microsoft.com/office/drawing/2014/main" id="{9ED8B3CC-9558-4726-8440-2DD3209BB8E0}"/>
+              </a:ext>
+            </a:extLst>
+          </p:cNvPr>
+          <p:cNvSpPr txBox="1"/>
+          <p:nvPr/>
+        </p:nvSpPr>
+        <p:spPr>
+          <a:xfrm>
+            <a:off x="4205974" y="921084"/>
+            <a:ext cx="880172" cy="276999"/>
+          </a:xfrm>
+          <a:prstGeom prst="rect">
+            <a:avLst/>
+          </a:prstGeom>
+          <a:noFill/>
+        </p:spPr>
+        <p:txBody>
+          <a:bodyPr wrap="square" rtlCol="0">
+            <a:spAutoFit/>
+          </a:bodyPr>
+          <a:lstStyle/>
+          <a:p>
+            <a:r>
+              <a:rPr lang="en-US" sz="1200" dirty="0"/>
+              <a:t>mapping</a:t>
+            </a:r>
+          </a:p>
+        </p:txBody>
+      </p:sp>
+      <p:sp>
+        <p:nvSpPr>
+          <p:cNvPr id="32" name="Textfeld 31">
+            <a:extLst>
+              <a:ext uri="{FF2B5EF4-FFF2-40B4-BE49-F238E27FC236}">
+                <a16:creationId xmlns:a16="http://schemas.microsoft.com/office/drawing/2014/main" id="{6D3FDA4C-7470-47B0-819F-E927130AB3F7}"/>
+              </a:ext>
+            </a:extLst>
+          </p:cNvPr>
+          <p:cNvSpPr txBox="1"/>
+          <p:nvPr/>
+        </p:nvSpPr>
+        <p:spPr>
+          <a:xfrm>
+            <a:off x="1155011" y="2601718"/>
+            <a:ext cx="1537175" cy="276999"/>
+          </a:xfrm>
+          <a:prstGeom prst="rect">
+            <a:avLst/>
+          </a:prstGeom>
+          <a:noFill/>
+        </p:spPr>
+        <p:txBody>
+          <a:bodyPr wrap="square" rtlCol="0">
+            <a:spAutoFit/>
+          </a:bodyPr>
+          <a:lstStyle/>
+          <a:p>
+            <a:r>
+              <a:rPr lang="en-US" sz="1200" dirty="0"/>
+              <a:t>workload</a:t>
+            </a:r>
+          </a:p>
+        </p:txBody>
+      </p:sp>
+      <p:sp>
+        <p:nvSpPr>
+          <p:cNvPr id="33" name="Textfeld 32">
+            <a:extLst>
+              <a:ext uri="{FF2B5EF4-FFF2-40B4-BE49-F238E27FC236}">
+                <a16:creationId xmlns:a16="http://schemas.microsoft.com/office/drawing/2014/main" id="{72A5C7EB-783C-4BE2-9355-8E0CDBD0B2DE}"/>
+              </a:ext>
+            </a:extLst>
+          </p:cNvPr>
+          <p:cNvSpPr txBox="1"/>
+          <p:nvPr/>
+        </p:nvSpPr>
+        <p:spPr>
+          <a:xfrm>
+            <a:off x="4301677" y="2858988"/>
+            <a:ext cx="768588" cy="276999"/>
+          </a:xfrm>
+          <a:prstGeom prst="rect">
+            <a:avLst/>
+          </a:prstGeom>
+          <a:noFill/>
+        </p:spPr>
+        <p:txBody>
+          <a:bodyPr wrap="square" rtlCol="0">
+            <a:spAutoFit/>
+          </a:bodyPr>
+          <a:lstStyle/>
+          <a:p>
+            <a:r>
+              <a:rPr lang="en-US" sz="1200" dirty="0"/>
+              <a:t>results</a:t>
+            </a:r>
+          </a:p>
+        </p:txBody>
+      </p:sp>
+      <p:cxnSp>
+        <p:nvCxnSpPr>
+          <p:cNvPr id="3" name="Gerade Verbindung mit Pfeil 2">
+            <a:extLst>
+              <a:ext uri="{FF2B5EF4-FFF2-40B4-BE49-F238E27FC236}">
+                <a16:creationId xmlns:a16="http://schemas.microsoft.com/office/drawing/2014/main" id="{EBE04A22-B050-46B9-ADAB-80F438608253}"/>
+              </a:ext>
+            </a:extLst>
+          </p:cNvPr>
+          <p:cNvCxnSpPr>
+            <a:cxnSpLocks/>
+            <a:endCxn id="4" idx="1"/>
+          </p:cNvCxnSpPr>
+          <p:nvPr/>
+        </p:nvCxnSpPr>
+        <p:spPr>
+          <a:xfrm>
+            <a:off x="783771" y="1198083"/>
+            <a:ext cx="1403519" cy="5774"/>
+          </a:xfrm>
+          <a:prstGeom prst="straightConnector1">
+            <a:avLst/>
+          </a:prstGeom>
+          <a:ln w="19050">
+            <a:tailEnd type="triangle"/>
+          </a:ln>
+        </p:spPr>
+        <p:style>
+          <a:lnRef idx="1">
+            <a:schemeClr val="dk1"/>
+          </a:lnRef>
+          <a:fillRef idx="0">
+            <a:schemeClr val="dk1"/>
+          </a:fillRef>
+          <a:effectRef idx="0">
+            <a:schemeClr val="dk1"/>
+          </a:effectRef>
+          <a:fontRef idx="minor">
+            <a:schemeClr val="tx1"/>
+          </a:fontRef>
+        </p:style>
+      </p:cxnSp>
+      <p:cxnSp>
+        <p:nvCxnSpPr>
+          <p:cNvPr id="36" name="Gerade Verbindung mit Pfeil 35">
+            <a:extLst>
+              <a:ext uri="{FF2B5EF4-FFF2-40B4-BE49-F238E27FC236}">
+                <a16:creationId xmlns:a16="http://schemas.microsoft.com/office/drawing/2014/main" id="{32E44944-A22D-4EED-93A8-E51AE6DED1B3}"/>
+              </a:ext>
+            </a:extLst>
+          </p:cNvPr>
+          <p:cNvCxnSpPr>
+            <a:cxnSpLocks/>
+            <a:stCxn id="4" idx="3"/>
+            <a:endCxn id="22" idx="1"/>
+          </p:cNvCxnSpPr>
+          <p:nvPr/>
+        </p:nvCxnSpPr>
+        <p:spPr>
+          <a:xfrm>
+            <a:off x="4179124" y="1203857"/>
+            <a:ext cx="845641" cy="6068"/>
+          </a:xfrm>
+          <a:prstGeom prst="straightConnector1">
+            <a:avLst/>
+          </a:prstGeom>
+          <a:ln w="19050">
+            <a:tailEnd type="triangle"/>
+          </a:ln>
+        </p:spPr>
+        <p:style>
+          <a:lnRef idx="1">
+            <a:schemeClr val="dk1"/>
+          </a:lnRef>
+          <a:fillRef idx="0">
+            <a:schemeClr val="dk1"/>
+          </a:fillRef>
+          <a:effectRef idx="0">
+            <a:schemeClr val="dk1"/>
+          </a:effectRef>
+          <a:fontRef idx="minor">
+            <a:schemeClr val="tx1"/>
+          </a:fontRef>
+        </p:style>
+      </p:cxnSp>
+      <p:cxnSp>
+        <p:nvCxnSpPr>
+          <p:cNvPr id="37" name="Verbinder: gewinkelt 36">
+            <a:extLst>
+              <a:ext uri="{FF2B5EF4-FFF2-40B4-BE49-F238E27FC236}">
+                <a16:creationId xmlns:a16="http://schemas.microsoft.com/office/drawing/2014/main" id="{3CFD610A-A8EF-420D-B57F-B297FD194E25}"/>
+              </a:ext>
+            </a:extLst>
+          </p:cNvPr>
+          <p:cNvCxnSpPr>
+            <a:stCxn id="22" idx="3"/>
+            <a:endCxn id="24" idx="1"/>
+          </p:cNvCxnSpPr>
+          <p:nvPr/>
+        </p:nvCxnSpPr>
+        <p:spPr>
+          <a:xfrm flipH="1">
+            <a:off x="2187290" y="1209925"/>
+            <a:ext cx="4829309" cy="1976313"/>
+          </a:xfrm>
+          <a:prstGeom prst="bentConnector5">
+            <a:avLst>
+              <a:gd name="adj1" fmla="val -4734"/>
+              <a:gd name="adj2" fmla="val 50000"/>
+              <a:gd name="adj3" fmla="val 104734"/>
+            </a:avLst>
+          </a:prstGeom>
+          <a:ln w="19050">
+            <a:tailEnd type="triangle"/>
+          </a:ln>
+        </p:spPr>
+        <p:style>
+          <a:lnRef idx="1">
+            <a:schemeClr val="dk1"/>
+          </a:lnRef>
+          <a:fillRef idx="0">
+            <a:schemeClr val="dk1"/>
+          </a:fillRef>
+          <a:effectRef idx="0">
+            <a:schemeClr val="dk1"/>
+          </a:effectRef>
+          <a:fontRef idx="minor">
+            <a:schemeClr val="tx1"/>
+          </a:fontRef>
+        </p:style>
+      </p:cxnSp>
+      <p:cxnSp>
+        <p:nvCxnSpPr>
+          <p:cNvPr id="49" name="Gerade Verbindung mit Pfeil 48">
+            <a:extLst>
+              <a:ext uri="{FF2B5EF4-FFF2-40B4-BE49-F238E27FC236}">
+                <a16:creationId xmlns:a16="http://schemas.microsoft.com/office/drawing/2014/main" id="{A551A2BE-9869-4EF7-8C9C-488CAA0A0E0A}"/>
+              </a:ext>
+            </a:extLst>
+          </p:cNvPr>
+          <p:cNvCxnSpPr>
+            <a:cxnSpLocks/>
+            <a:stCxn id="24" idx="3"/>
+            <a:endCxn id="25" idx="1"/>
+          </p:cNvCxnSpPr>
+          <p:nvPr/>
+        </p:nvCxnSpPr>
+        <p:spPr>
+          <a:xfrm>
+            <a:off x="4179124" y="3186238"/>
+            <a:ext cx="845641" cy="0"/>
+          </a:xfrm>
+          <a:prstGeom prst="straightConnector1">
+            <a:avLst/>
+          </a:prstGeom>
+          <a:ln w="19050">
+            <a:tailEnd type="triangle"/>
+          </a:ln>
+        </p:spPr>
+        <p:style>
+          <a:lnRef idx="1">
+            <a:schemeClr val="dk1"/>
+          </a:lnRef>
+          <a:fillRef idx="0">
+            <a:schemeClr val="dk1"/>
+          </a:fillRef>
+          <a:effectRef idx="0">
+            <a:schemeClr val="dk1"/>
+          </a:effectRef>
+          <a:fontRef idx="minor">
+            <a:schemeClr val="tx1"/>
+          </a:fontRef>
+        </p:style>
+      </p:cxnSp>
+      <p:cxnSp>
+        <p:nvCxnSpPr>
+          <p:cNvPr id="53" name="Gerade Verbindung mit Pfeil 52">
+            <a:extLst>
+              <a:ext uri="{FF2B5EF4-FFF2-40B4-BE49-F238E27FC236}">
+                <a16:creationId xmlns:a16="http://schemas.microsoft.com/office/drawing/2014/main" id="{C22EF7AD-9E55-48CE-91CB-A35A61E7D9F3}"/>
+              </a:ext>
+            </a:extLst>
+          </p:cNvPr>
+          <p:cNvCxnSpPr>
+            <a:cxnSpLocks/>
+            <a:stCxn id="25" idx="3"/>
+          </p:cNvCxnSpPr>
+          <p:nvPr/>
+        </p:nvCxnSpPr>
+        <p:spPr>
+          <a:xfrm>
+            <a:off x="7016599" y="3186238"/>
+            <a:ext cx="845641" cy="0"/>
+          </a:xfrm>
+          <a:prstGeom prst="straightConnector1">
+            <a:avLst/>
+          </a:prstGeom>
+          <a:ln w="19050">
+            <a:tailEnd type="triangle"/>
+          </a:ln>
+        </p:spPr>
+        <p:style>
+          <a:lnRef idx="1">
+            <a:schemeClr val="dk1"/>
+          </a:lnRef>
+          <a:fillRef idx="0">
+            <a:schemeClr val="dk1"/>
+          </a:fillRef>
+          <a:effectRef idx="0">
+            <a:schemeClr val="dk1"/>
+          </a:effectRef>
+          <a:fontRef idx="minor">
+            <a:schemeClr val="tx1"/>
+          </a:fontRef>
+        </p:style>
+      </p:cxnSp>
+      <p:sp>
+        <p:nvSpPr>
+          <p:cNvPr id="55" name="Textfeld 54">
+            <a:extLst>
+              <a:ext uri="{FF2B5EF4-FFF2-40B4-BE49-F238E27FC236}">
+                <a16:creationId xmlns:a16="http://schemas.microsoft.com/office/drawing/2014/main" id="{3AD52641-A787-41CA-B043-DB7B533BC9B1}"/>
+              </a:ext>
+            </a:extLst>
+          </p:cNvPr>
+          <p:cNvSpPr txBox="1"/>
+          <p:nvPr/>
+        </p:nvSpPr>
+        <p:spPr>
+          <a:xfrm>
+            <a:off x="7020209" y="2878455"/>
+            <a:ext cx="1191973" cy="276999"/>
+          </a:xfrm>
+          <a:prstGeom prst="rect">
+            <a:avLst/>
+          </a:prstGeom>
+          <a:noFill/>
+        </p:spPr>
+        <p:txBody>
+          <a:bodyPr wrap="square" rtlCol="0">
+            <a:spAutoFit/>
+          </a:bodyPr>
+          <a:lstStyle/>
+          <a:p>
+            <a:r>
+              <a:rPr lang="en-US" sz="1200" dirty="0" err="1"/>
+              <a:t>boxPlotValues</a:t>
+            </a:r>
+            <a:endParaRPr lang="en-US" sz="1200" dirty="0"/>
+          </a:p>
+        </p:txBody>
+      </p:sp>
+    </p:spTree>
+    <p:extLst>
+      <p:ext uri="{BB962C8B-B14F-4D97-AF65-F5344CB8AC3E}">
+        <p14:creationId xmlns:p14="http://schemas.microsoft.com/office/powerpoint/2010/main" val="2366572989"/>
+      </p:ext>
+    </p:extLst>
+  </p:cSld>
+  <p:clrMapOvr>
+    <a:masterClrMapping/>
+  </p:clrMapOvr>
+</p:sld>
+</file>
+
 <file path=ppt/theme/theme1.xml><?xml version="1.0" encoding="utf-8"?>
 <a:theme xmlns:a="http://schemas.openxmlformats.org/drawingml/2006/main" name="Office">
   <a:themeElements>

</xml_diff>

<commit_message>
- remove deprecated frontend and documentation - update docs and usage info - (fix) optional service link file
</commit_message>
<xml_diff>
--- a/doc/figures.pptx
+++ b/doc/figures.pptx
@@ -5,8 +5,7 @@
     <p:sldMasterId id="2147483648" r:id="rId1"/>
   </p:sldMasterIdLst>
   <p:sldIdLst>
-    <p:sldId id="256" r:id="rId2"/>
-    <p:sldId id="257" r:id="rId3"/>
+    <p:sldId id="257" r:id="rId2"/>
   </p:sldIdLst>
   <p:sldSz cx="12192000" cy="6858000"/>
   <p:notesSz cx="6858000" cy="9144000"/>
@@ -262,7 +261,7 @@
           <a:p>
             <a:fld id="{F36CA848-63D9-472F-B641-DA0BAA5239E6}" type="datetimeFigureOut">
               <a:rPr lang="en-US" smtClean="0"/>
-              <a:t>2/13/2020</a:t>
+              <a:t>9/3/2020</a:t>
             </a:fld>
             <a:endParaRPr lang="en-US"/>
           </a:p>
@@ -462,7 +461,7 @@
           <a:p>
             <a:fld id="{F36CA848-63D9-472F-B641-DA0BAA5239E6}" type="datetimeFigureOut">
               <a:rPr lang="en-US" smtClean="0"/>
-              <a:t>2/13/2020</a:t>
+              <a:t>9/3/2020</a:t>
             </a:fld>
             <a:endParaRPr lang="en-US"/>
           </a:p>
@@ -672,7 +671,7 @@
           <a:p>
             <a:fld id="{F36CA848-63D9-472F-B641-DA0BAA5239E6}" type="datetimeFigureOut">
               <a:rPr lang="en-US" smtClean="0"/>
-              <a:t>2/13/2020</a:t>
+              <a:t>9/3/2020</a:t>
             </a:fld>
             <a:endParaRPr lang="en-US"/>
           </a:p>
@@ -872,7 +871,7 @@
           <a:p>
             <a:fld id="{F36CA848-63D9-472F-B641-DA0BAA5239E6}" type="datetimeFigureOut">
               <a:rPr lang="en-US" smtClean="0"/>
-              <a:t>2/13/2020</a:t>
+              <a:t>9/3/2020</a:t>
             </a:fld>
             <a:endParaRPr lang="en-US"/>
           </a:p>
@@ -1148,7 +1147,7 @@
           <a:p>
             <a:fld id="{F36CA848-63D9-472F-B641-DA0BAA5239E6}" type="datetimeFigureOut">
               <a:rPr lang="en-US" smtClean="0"/>
-              <a:t>2/13/2020</a:t>
+              <a:t>9/3/2020</a:t>
             </a:fld>
             <a:endParaRPr lang="en-US"/>
           </a:p>
@@ -1416,7 +1415,7 @@
           <a:p>
             <a:fld id="{F36CA848-63D9-472F-B641-DA0BAA5239E6}" type="datetimeFigureOut">
               <a:rPr lang="en-US" smtClean="0"/>
-              <a:t>2/13/2020</a:t>
+              <a:t>9/3/2020</a:t>
             </a:fld>
             <a:endParaRPr lang="en-US"/>
           </a:p>
@@ -1831,7 +1830,7 @@
           <a:p>
             <a:fld id="{F36CA848-63D9-472F-B641-DA0BAA5239E6}" type="datetimeFigureOut">
               <a:rPr lang="en-US" smtClean="0"/>
-              <a:t>2/13/2020</a:t>
+              <a:t>9/3/2020</a:t>
             </a:fld>
             <a:endParaRPr lang="en-US"/>
           </a:p>
@@ -1973,7 +1972,7 @@
           <a:p>
             <a:fld id="{F36CA848-63D9-472F-B641-DA0BAA5239E6}" type="datetimeFigureOut">
               <a:rPr lang="en-US" smtClean="0"/>
-              <a:t>2/13/2020</a:t>
+              <a:t>9/3/2020</a:t>
             </a:fld>
             <a:endParaRPr lang="en-US"/>
           </a:p>
@@ -2086,7 +2085,7 @@
           <a:p>
             <a:fld id="{F36CA848-63D9-472F-B641-DA0BAA5239E6}" type="datetimeFigureOut">
               <a:rPr lang="en-US" smtClean="0"/>
-              <a:t>2/13/2020</a:t>
+              <a:t>9/3/2020</a:t>
             </a:fld>
             <a:endParaRPr lang="en-US"/>
           </a:p>
@@ -2399,7 +2398,7 @@
           <a:p>
             <a:fld id="{F36CA848-63D9-472F-B641-DA0BAA5239E6}" type="datetimeFigureOut">
               <a:rPr lang="en-US" smtClean="0"/>
-              <a:t>2/13/2020</a:t>
+              <a:t>9/3/2020</a:t>
             </a:fld>
             <a:endParaRPr lang="en-US"/>
           </a:p>
@@ -2688,7 +2687,7 @@
           <a:p>
             <a:fld id="{F36CA848-63D9-472F-B641-DA0BAA5239E6}" type="datetimeFigureOut">
               <a:rPr lang="en-US" smtClean="0"/>
-              <a:t>2/13/2020</a:t>
+              <a:t>9/3/2020</a:t>
             </a:fld>
             <a:endParaRPr lang="en-US"/>
           </a:p>
@@ -2931,7 +2930,7 @@
           <a:p>
             <a:fld id="{F36CA848-63D9-472F-B641-DA0BAA5239E6}" type="datetimeFigureOut">
               <a:rPr lang="en-US" smtClean="0"/>
-              <a:t>2/13/2020</a:t>
+              <a:t>9/3/2020</a:t>
             </a:fld>
             <a:endParaRPr lang="en-US"/>
           </a:p>
@@ -3362,7 +3361,7 @@
         </p:nvSpPr>
         <p:spPr>
           <a:xfrm>
-            <a:off x="3474182" y="1554501"/>
+            <a:off x="2187290" y="810117"/>
             <a:ext cx="1991834" cy="787479"/>
           </a:xfrm>
           <a:prstGeom prst="rect">
@@ -3399,22 +3398,27 @@
           <a:p>
             <a:pPr algn="ctr"/>
             <a:r>
-              <a:rPr lang="en-US" sz="3000" b="1" dirty="0">
+              <a:rPr lang="en-US" sz="2000" b="1" dirty="0" err="1">
                 <a:solidFill>
                   <a:schemeClr val="tx1"/>
                 </a:solidFill>
               </a:rPr>
-              <a:t>Frontend</a:t>
-            </a:r>
-          </a:p>
-        </p:txBody>
-      </p:sp>
-      <p:sp>
-        <p:nvSpPr>
-          <p:cNvPr id="5" name="Rechteck 4">
-            <a:extLst>
-              <a:ext uri="{FF2B5EF4-FFF2-40B4-BE49-F238E27FC236}">
-                <a16:creationId xmlns:a16="http://schemas.microsoft.com/office/drawing/2014/main" id="{42E3CC04-FE45-4601-BC06-BA8461021D61}"/>
+              <a:t>MatchingTool</a:t>
+            </a:r>
+            <a:endParaRPr lang="en-US" sz="2000" b="1" dirty="0">
+              <a:solidFill>
+                <a:schemeClr val="tx1"/>
+              </a:solidFill>
+            </a:endParaRPr>
+          </a:p>
+        </p:txBody>
+      </p:sp>
+      <p:sp>
+        <p:nvSpPr>
+          <p:cNvPr id="6" name="Rechteck 5">
+            <a:extLst>
+              <a:ext uri="{FF2B5EF4-FFF2-40B4-BE49-F238E27FC236}">
+                <a16:creationId xmlns:a16="http://schemas.microsoft.com/office/drawing/2014/main" id="{3BFD4F07-7A8D-4898-87A2-F09FB0ACC0C1}"/>
               </a:ext>
             </a:extLst>
           </p:cNvPr>
@@ -3423,7 +3427,7 @@
         </p:nvSpPr>
         <p:spPr>
           <a:xfrm>
-            <a:off x="3474182" y="2979435"/>
+            <a:off x="927682" y="4404368"/>
             <a:ext cx="1991834" cy="787479"/>
           </a:xfrm>
           <a:prstGeom prst="rect">
@@ -3465,17 +3469,17 @@
                   <a:schemeClr val="tx1"/>
                 </a:solidFill>
               </a:rPr>
-              <a:t>Backend</a:t>
-            </a:r>
-          </a:p>
-        </p:txBody>
-      </p:sp>
-      <p:sp>
-        <p:nvSpPr>
-          <p:cNvPr id="6" name="Rechteck 5">
-            <a:extLst>
-              <a:ext uri="{FF2B5EF4-FFF2-40B4-BE49-F238E27FC236}">
-                <a16:creationId xmlns:a16="http://schemas.microsoft.com/office/drawing/2014/main" id="{3BFD4F07-7A8D-4898-87A2-F09FB0ACC0C1}"/>
+              <a:t>Worker</a:t>
+            </a:r>
+          </a:p>
+        </p:txBody>
+      </p:sp>
+      <p:sp>
+        <p:nvSpPr>
+          <p:cNvPr id="7" name="Rechteck 6">
+            <a:extLst>
+              <a:ext uri="{FF2B5EF4-FFF2-40B4-BE49-F238E27FC236}">
+                <a16:creationId xmlns:a16="http://schemas.microsoft.com/office/drawing/2014/main" id="{CF6D7632-3CC3-48FA-8623-1FF478A62D46}"/>
               </a:ext>
             </a:extLst>
           </p:cNvPr>
@@ -3484,7 +3488,7 @@
         </p:nvSpPr>
         <p:spPr>
           <a:xfrm>
-            <a:off x="927682" y="4404368"/>
+            <a:off x="6020682" y="4404368"/>
             <a:ext cx="1991834" cy="787479"/>
           </a:xfrm>
           <a:prstGeom prst="rect">
@@ -3533,10 +3537,10 @@
       </p:sp>
       <p:sp>
         <p:nvSpPr>
-          <p:cNvPr id="7" name="Rechteck 6">
-            <a:extLst>
-              <a:ext uri="{FF2B5EF4-FFF2-40B4-BE49-F238E27FC236}">
-                <a16:creationId xmlns:a16="http://schemas.microsoft.com/office/drawing/2014/main" id="{CF6D7632-3CC3-48FA-8623-1FF478A62D46}"/>
+          <p:cNvPr id="8" name="Rechteck 7">
+            <a:extLst>
+              <a:ext uri="{FF2B5EF4-FFF2-40B4-BE49-F238E27FC236}">
+                <a16:creationId xmlns:a16="http://schemas.microsoft.com/office/drawing/2014/main" id="{A624305E-2535-4145-80E0-E967FD4FC6F1}"/>
               </a:ext>
             </a:extLst>
           </p:cNvPr>
@@ -3545,7 +3549,7 @@
         </p:nvSpPr>
         <p:spPr>
           <a:xfrm>
-            <a:off x="6020682" y="4404368"/>
+            <a:off x="3474182" y="4404369"/>
             <a:ext cx="1991834" cy="787479"/>
           </a:xfrm>
           <a:prstGeom prst="rect">
@@ -3594,10 +3598,10 @@
       </p:sp>
       <p:sp>
         <p:nvSpPr>
-          <p:cNvPr id="8" name="Rechteck 7">
-            <a:extLst>
-              <a:ext uri="{FF2B5EF4-FFF2-40B4-BE49-F238E27FC236}">
-                <a16:creationId xmlns:a16="http://schemas.microsoft.com/office/drawing/2014/main" id="{A624305E-2535-4145-80E0-E967FD4FC6F1}"/>
+          <p:cNvPr id="11" name="Ellipse 10">
+            <a:extLst>
+              <a:ext uri="{FF2B5EF4-FFF2-40B4-BE49-F238E27FC236}">
+                <a16:creationId xmlns:a16="http://schemas.microsoft.com/office/drawing/2014/main" id="{5AD7F7F9-8D32-4161-BA33-C551305F4F45}"/>
               </a:ext>
             </a:extLst>
           </p:cNvPr>
@@ -3606,10 +3610,10 @@
         </p:nvSpPr>
         <p:spPr>
           <a:xfrm>
-            <a:off x="3474182" y="4404369"/>
-            <a:ext cx="1991834" cy="787479"/>
-          </a:xfrm>
-          <a:prstGeom prst="rect">
+            <a:off x="3411273" y="5829302"/>
+            <a:ext cx="2117653" cy="587446"/>
+          </a:xfrm>
+          <a:prstGeom prst="ellipse">
             <a:avLst/>
           </a:prstGeom>
           <a:solidFill>
@@ -3648,128 +3652,6 @@
                   <a:schemeClr val="tx1"/>
                 </a:solidFill>
               </a:rPr>
-              <a:t>Worker</a:t>
-            </a:r>
-          </a:p>
-        </p:txBody>
-      </p:sp>
-      <p:sp>
-        <p:nvSpPr>
-          <p:cNvPr id="10" name="Ellipse 9">
-            <a:extLst>
-              <a:ext uri="{FF2B5EF4-FFF2-40B4-BE49-F238E27FC236}">
-                <a16:creationId xmlns:a16="http://schemas.microsoft.com/office/drawing/2014/main" id="{7DF8BE90-3508-41FB-ABE1-6994CB4A47EC}"/>
-              </a:ext>
-            </a:extLst>
-          </p:cNvPr>
-          <p:cNvSpPr/>
-          <p:nvPr/>
-        </p:nvSpPr>
-        <p:spPr>
-          <a:xfrm>
-            <a:off x="3411273" y="329600"/>
-            <a:ext cx="2117653" cy="587446"/>
-          </a:xfrm>
-          <a:prstGeom prst="ellipse">
-            <a:avLst/>
-          </a:prstGeom>
-          <a:solidFill>
-            <a:schemeClr val="bg1"/>
-          </a:solidFill>
-          <a:ln w="50800">
-            <a:solidFill>
-              <a:schemeClr val="tx1"/>
-            </a:solidFill>
-          </a:ln>
-        </p:spPr>
-        <p:style>
-          <a:lnRef idx="2">
-            <a:schemeClr val="accent1">
-              <a:shade val="50000"/>
-            </a:schemeClr>
-          </a:lnRef>
-          <a:fillRef idx="1">
-            <a:schemeClr val="accent1"/>
-          </a:fillRef>
-          <a:effectRef idx="0">
-            <a:schemeClr val="accent1"/>
-          </a:effectRef>
-          <a:fontRef idx="minor">
-            <a:schemeClr val="lt1"/>
-          </a:fontRef>
-        </p:style>
-        <p:txBody>
-          <a:bodyPr rtlCol="0" anchor="ctr"/>
-          <a:lstStyle/>
-          <a:p>
-            <a:pPr algn="ctr"/>
-            <a:r>
-              <a:rPr lang="en-US" sz="3000" b="1" dirty="0">
-                <a:solidFill>
-                  <a:schemeClr val="tx1"/>
-                </a:solidFill>
-              </a:rPr>
-              <a:t>Browser</a:t>
-            </a:r>
-          </a:p>
-        </p:txBody>
-      </p:sp>
-      <p:sp>
-        <p:nvSpPr>
-          <p:cNvPr id="11" name="Ellipse 10">
-            <a:extLst>
-              <a:ext uri="{FF2B5EF4-FFF2-40B4-BE49-F238E27FC236}">
-                <a16:creationId xmlns:a16="http://schemas.microsoft.com/office/drawing/2014/main" id="{5AD7F7F9-8D32-4161-BA33-C551305F4F45}"/>
-              </a:ext>
-            </a:extLst>
-          </p:cNvPr>
-          <p:cNvSpPr/>
-          <p:nvPr/>
-        </p:nvSpPr>
-        <p:spPr>
-          <a:xfrm>
-            <a:off x="3411273" y="5829302"/>
-            <a:ext cx="2117653" cy="587446"/>
-          </a:xfrm>
-          <a:prstGeom prst="ellipse">
-            <a:avLst/>
-          </a:prstGeom>
-          <a:solidFill>
-            <a:schemeClr val="bg1"/>
-          </a:solidFill>
-          <a:ln w="50800">
-            <a:solidFill>
-              <a:schemeClr val="tx1"/>
-            </a:solidFill>
-          </a:ln>
-        </p:spPr>
-        <p:style>
-          <a:lnRef idx="2">
-            <a:schemeClr val="accent1">
-              <a:shade val="50000"/>
-            </a:schemeClr>
-          </a:lnRef>
-          <a:fillRef idx="1">
-            <a:schemeClr val="accent1"/>
-          </a:fillRef>
-          <a:effectRef idx="0">
-            <a:schemeClr val="accent1"/>
-          </a:effectRef>
-          <a:fontRef idx="minor">
-            <a:schemeClr val="lt1"/>
-          </a:fontRef>
-        </p:style>
-        <p:txBody>
-          <a:bodyPr rtlCol="0" anchor="ctr"/>
-          <a:lstStyle/>
-          <a:p>
-            <a:pPr algn="ctr"/>
-            <a:r>
-              <a:rPr lang="en-US" sz="3000" b="1" dirty="0">
-                <a:solidFill>
-                  <a:schemeClr val="tx1"/>
-                </a:solidFill>
-              </a:rPr>
               <a:t>SUT</a:t>
             </a:r>
           </a:p>
@@ -3777,115 +3659,29 @@
       </p:sp>
       <p:cxnSp>
         <p:nvCxnSpPr>
-          <p:cNvPr id="13" name="Gerade Verbindung mit Pfeil 12">
-            <a:extLst>
-              <a:ext uri="{FF2B5EF4-FFF2-40B4-BE49-F238E27FC236}">
-                <a16:creationId xmlns:a16="http://schemas.microsoft.com/office/drawing/2014/main" id="{5C6E03ED-893A-47E4-A308-887B460A668A}"/>
+          <p:cNvPr id="17" name="Gerade Verbindung mit Pfeil 16">
+            <a:extLst>
+              <a:ext uri="{FF2B5EF4-FFF2-40B4-BE49-F238E27FC236}">
+                <a16:creationId xmlns:a16="http://schemas.microsoft.com/office/drawing/2014/main" id="{454A54FF-872A-4CE6-94A4-B8FE578663A1}"/>
               </a:ext>
             </a:extLst>
           </p:cNvPr>
           <p:cNvCxnSpPr>
             <a:cxnSpLocks/>
+            <a:stCxn id="8" idx="0"/>
+            <a:endCxn id="24" idx="2"/>
           </p:cNvCxnSpPr>
           <p:nvPr/>
         </p:nvCxnSpPr>
         <p:spPr>
-          <a:xfrm flipH="1">
-            <a:off x="4470099" y="917046"/>
-            <a:ext cx="1" cy="637455"/>
-          </a:xfrm>
-          <a:prstGeom prst="straightConnector1">
-            <a:avLst/>
-          </a:prstGeom>
-          <a:ln w="50800">
-            <a:solidFill>
-              <a:schemeClr val="tx1"/>
-            </a:solidFill>
-            <a:headEnd type="triangle"/>
-            <a:tailEnd type="triangle"/>
-          </a:ln>
-        </p:spPr>
-        <p:style>
-          <a:lnRef idx="1">
-            <a:schemeClr val="accent1"/>
-          </a:lnRef>
-          <a:fillRef idx="0">
-            <a:schemeClr val="accent1"/>
-          </a:fillRef>
-          <a:effectRef idx="0">
-            <a:schemeClr val="accent1"/>
-          </a:effectRef>
-          <a:fontRef idx="minor">
-            <a:schemeClr val="tx1"/>
-          </a:fontRef>
-        </p:style>
-      </p:cxnSp>
-      <p:cxnSp>
-        <p:nvCxnSpPr>
-          <p:cNvPr id="14" name="Gerade Verbindung mit Pfeil 13">
-            <a:extLst>
-              <a:ext uri="{FF2B5EF4-FFF2-40B4-BE49-F238E27FC236}">
-                <a16:creationId xmlns:a16="http://schemas.microsoft.com/office/drawing/2014/main" id="{BB5ACDD1-90BF-4E4D-BBCC-ADD185848A6A}"/>
-              </a:ext>
-            </a:extLst>
-          </p:cNvPr>
-          <p:cNvCxnSpPr>
-            <a:cxnSpLocks/>
-          </p:cNvCxnSpPr>
-          <p:nvPr/>
-        </p:nvCxnSpPr>
-        <p:spPr>
-          <a:xfrm flipV="1">
-            <a:off x="4470099" y="2341980"/>
-            <a:ext cx="0" cy="637455"/>
-          </a:xfrm>
-          <a:prstGeom prst="straightConnector1">
-            <a:avLst/>
-          </a:prstGeom>
-          <a:ln w="50800">
-            <a:solidFill>
-              <a:schemeClr val="tx1"/>
-            </a:solidFill>
-            <a:headEnd type="triangle"/>
-            <a:tailEnd type="triangle"/>
-          </a:ln>
-        </p:spPr>
-        <p:style>
-          <a:lnRef idx="1">
-            <a:schemeClr val="accent1"/>
-          </a:lnRef>
-          <a:fillRef idx="0">
-            <a:schemeClr val="accent1"/>
-          </a:fillRef>
-          <a:effectRef idx="0">
-            <a:schemeClr val="accent1"/>
-          </a:effectRef>
-          <a:fontRef idx="minor">
-            <a:schemeClr val="tx1"/>
-          </a:fontRef>
-        </p:style>
-      </p:cxnSp>
-      <p:cxnSp>
-        <p:nvCxnSpPr>
-          <p:cNvPr id="17" name="Gerade Verbindung mit Pfeil 16">
-            <a:extLst>
-              <a:ext uri="{FF2B5EF4-FFF2-40B4-BE49-F238E27FC236}">
-                <a16:creationId xmlns:a16="http://schemas.microsoft.com/office/drawing/2014/main" id="{454A54FF-872A-4CE6-94A4-B8FE578663A1}"/>
-              </a:ext>
-            </a:extLst>
-          </p:cNvPr>
-          <p:cNvCxnSpPr>
-            <a:cxnSpLocks/>
-          </p:cNvCxnSpPr>
-          <p:nvPr/>
-        </p:nvCxnSpPr>
-        <p:spPr>
-          <a:xfrm flipV="1">
-            <a:off x="4470099" y="3766914"/>
-            <a:ext cx="0" cy="637455"/>
-          </a:xfrm>
-          <a:prstGeom prst="straightConnector1">
-            <a:avLst/>
+          <a:xfrm rot="16200000" flipV="1">
+            <a:off x="3414457" y="3348727"/>
+            <a:ext cx="824392" cy="1286892"/>
+          </a:xfrm>
+          <a:prstGeom prst="bentConnector3">
+            <a:avLst>
+              <a:gd name="adj1" fmla="val 50000"/>
+            </a:avLst>
           </a:prstGeom>
           <a:ln w="50800">
             <a:solidFill>
@@ -3967,14 +3763,14 @@
           <p:cNvCxnSpPr>
             <a:cxnSpLocks/>
             <a:stCxn id="7" idx="0"/>
-            <a:endCxn id="5" idx="2"/>
+            <a:endCxn id="24" idx="2"/>
           </p:cNvCxnSpPr>
           <p:nvPr/>
         </p:nvCxnSpPr>
         <p:spPr>
           <a:xfrm rot="16200000" flipV="1">
-            <a:off x="5424622" y="2812391"/>
-            <a:ext cx="637454" cy="2546500"/>
+            <a:off x="4687708" y="2075477"/>
+            <a:ext cx="824391" cy="3833392"/>
           </a:xfrm>
           <a:prstGeom prst="bentConnector3">
             <a:avLst>
@@ -4016,14 +3812,14 @@
           <p:cNvCxnSpPr>
             <a:cxnSpLocks/>
             <a:stCxn id="6" idx="0"/>
-            <a:endCxn id="5" idx="2"/>
+            <a:endCxn id="24" idx="2"/>
           </p:cNvCxnSpPr>
           <p:nvPr/>
         </p:nvCxnSpPr>
         <p:spPr>
           <a:xfrm rot="5400000" flipH="1" flipV="1">
-            <a:off x="2878122" y="2812391"/>
-            <a:ext cx="637454" cy="2546500"/>
+            <a:off x="2141208" y="3362369"/>
+            <a:ext cx="824391" cy="1259608"/>
           </a:xfrm>
           <a:prstGeom prst="bentConnector3">
             <a:avLst>
@@ -4161,8 +3957,8 @@
         </p:nvSpPr>
         <p:spPr>
           <a:xfrm>
-            <a:off x="446562" y="1294514"/>
-            <a:ext cx="8038214" cy="4159987"/>
+            <a:off x="446562" y="321734"/>
+            <a:ext cx="8038214" cy="5132768"/>
           </a:xfrm>
           <a:prstGeom prst="roundRect">
             <a:avLst/>
@@ -4361,47 +4157,25 @@
           <a:p>
             <a:r>
               <a:rPr lang="en-US" dirty="0"/>
-              <a:t>Front- and Backend can and should run on the same instance.</a:t>
-            </a:r>
-          </a:p>
-        </p:txBody>
-      </p:sp>
-    </p:spTree>
-    <p:extLst>
-      <p:ext uri="{BB962C8B-B14F-4D97-AF65-F5344CB8AC3E}">
-        <p14:creationId xmlns:p14="http://schemas.microsoft.com/office/powerpoint/2010/main" val="3030961912"/>
-      </p:ext>
-    </p:extLst>
-  </p:cSld>
-  <p:clrMapOvr>
-    <a:masterClrMapping/>
-  </p:clrMapOvr>
-</p:sld>
-</file>
-
-<file path=ppt/slides/slide2.xml><?xml version="1.0" encoding="utf-8"?>
-<p:sld xmlns:a="http://schemas.openxmlformats.org/drawingml/2006/main" xmlns:r="http://schemas.openxmlformats.org/officeDocument/2006/relationships" xmlns:p="http://schemas.openxmlformats.org/presentationml/2006/main">
-  <p:cSld>
-    <p:spTree>
-      <p:nvGrpSpPr>
-        <p:cNvPr id="1" name=""/>
-        <p:cNvGrpSpPr/>
-        <p:nvPr/>
-      </p:nvGrpSpPr>
-      <p:grpSpPr>
-        <a:xfrm>
-          <a:off x="0" y="0"/>
-          <a:ext cx="0" cy="0"/>
-          <a:chOff x="0" y="0"/>
-          <a:chExt cx="0" cy="0"/>
-        </a:xfrm>
-      </p:grpSpPr>
-      <p:sp>
-        <p:nvSpPr>
-          <p:cNvPr id="4" name="Rechteck 3">
-            <a:extLst>
-              <a:ext uri="{FF2B5EF4-FFF2-40B4-BE49-F238E27FC236}">
-                <a16:creationId xmlns:a16="http://schemas.microsoft.com/office/drawing/2014/main" id="{AA45C57D-DD49-4211-8556-4EB6B20D97E7}"/>
+              <a:t>All </a:t>
+            </a:r>
+            <a:r>
+              <a:rPr lang="en-US" dirty="0" err="1"/>
+              <a:t>openISBT</a:t>
+            </a:r>
+            <a:r>
+              <a:rPr lang="en-US" dirty="0"/>
+              <a:t> tools can and should run on the same instance.</a:t>
+            </a:r>
+          </a:p>
+        </p:txBody>
+      </p:sp>
+      <p:sp>
+        <p:nvSpPr>
+          <p:cNvPr id="22" name="Rechteck 21">
+            <a:extLst>
+              <a:ext uri="{FF2B5EF4-FFF2-40B4-BE49-F238E27FC236}">
+                <a16:creationId xmlns:a16="http://schemas.microsoft.com/office/drawing/2014/main" id="{50033A41-24CC-42AF-8C6C-FB683038588D}"/>
               </a:ext>
             </a:extLst>
           </p:cNvPr>
@@ -4410,7 +4184,7 @@
         </p:nvSpPr>
         <p:spPr>
           <a:xfrm>
-            <a:off x="2187290" y="810117"/>
+            <a:off x="3598657" y="1785104"/>
             <a:ext cx="1991834" cy="787479"/>
           </a:xfrm>
           <a:prstGeom prst="rect">
@@ -4447,27 +4221,22 @@
           <a:p>
             <a:pPr algn="ctr"/>
             <a:r>
-              <a:rPr lang="en-US" sz="2000" b="1" dirty="0" err="1">
+              <a:rPr lang="en-US" sz="2000" b="1" dirty="0">
                 <a:solidFill>
                   <a:schemeClr val="tx1"/>
                 </a:solidFill>
               </a:rPr>
-              <a:t>MatchingTool</a:t>
-            </a:r>
-            <a:endParaRPr lang="en-US" sz="2000" b="1" dirty="0">
-              <a:solidFill>
-                <a:schemeClr val="tx1"/>
-              </a:solidFill>
-            </a:endParaRPr>
-          </a:p>
-        </p:txBody>
-      </p:sp>
-      <p:sp>
-        <p:nvSpPr>
-          <p:cNvPr id="6" name="Rechteck 5">
-            <a:extLst>
-              <a:ext uri="{FF2B5EF4-FFF2-40B4-BE49-F238E27FC236}">
-                <a16:creationId xmlns:a16="http://schemas.microsoft.com/office/drawing/2014/main" id="{3BFD4F07-7A8D-4898-87A2-F09FB0ACC0C1}"/>
+              <a:t>Workload Generator</a:t>
+            </a:r>
+          </a:p>
+        </p:txBody>
+      </p:sp>
+      <p:sp>
+        <p:nvSpPr>
+          <p:cNvPr id="24" name="Rechteck 23">
+            <a:extLst>
+              <a:ext uri="{FF2B5EF4-FFF2-40B4-BE49-F238E27FC236}">
+                <a16:creationId xmlns:a16="http://schemas.microsoft.com/office/drawing/2014/main" id="{B73AC2A5-499C-4EF4-82D7-74C2C452A0F1}"/>
               </a:ext>
             </a:extLst>
           </p:cNvPr>
@@ -4476,7 +4245,7 @@
         </p:nvSpPr>
         <p:spPr>
           <a:xfrm>
-            <a:off x="927682" y="4404368"/>
+            <a:off x="2187290" y="2792498"/>
             <a:ext cx="1991834" cy="787479"/>
           </a:xfrm>
           <a:prstGeom prst="rect">
@@ -4513,22 +4282,22 @@
           <a:p>
             <a:pPr algn="ctr"/>
             <a:r>
-              <a:rPr lang="en-US" sz="3000" b="1" dirty="0">
+              <a:rPr lang="en-US" sz="2000" b="1" dirty="0">
                 <a:solidFill>
                   <a:schemeClr val="tx1"/>
                 </a:solidFill>
               </a:rPr>
-              <a:t>Worker</a:t>
-            </a:r>
-          </a:p>
-        </p:txBody>
-      </p:sp>
-      <p:sp>
-        <p:nvSpPr>
-          <p:cNvPr id="7" name="Rechteck 6">
-            <a:extLst>
-              <a:ext uri="{FF2B5EF4-FFF2-40B4-BE49-F238E27FC236}">
-                <a16:creationId xmlns:a16="http://schemas.microsoft.com/office/drawing/2014/main" id="{CF6D7632-3CC3-48FA-8623-1FF478A62D46}"/>
+              <a:t>Run Tool</a:t>
+            </a:r>
+          </a:p>
+        </p:txBody>
+      </p:sp>
+      <p:sp>
+        <p:nvSpPr>
+          <p:cNvPr id="25" name="Rechteck 24">
+            <a:extLst>
+              <a:ext uri="{FF2B5EF4-FFF2-40B4-BE49-F238E27FC236}">
+                <a16:creationId xmlns:a16="http://schemas.microsoft.com/office/drawing/2014/main" id="{CAAAB417-F116-420A-ABE5-8C3CA447E95F}"/>
               </a:ext>
             </a:extLst>
           </p:cNvPr>
@@ -4537,7 +4306,7 @@
         </p:nvSpPr>
         <p:spPr>
           <a:xfrm>
-            <a:off x="6020682" y="4404368"/>
+            <a:off x="5024765" y="2792498"/>
             <a:ext cx="1991834" cy="787479"/>
           </a:xfrm>
           <a:prstGeom prst="rect">
@@ -4574,824 +4343,6 @@
           <a:p>
             <a:pPr algn="ctr"/>
             <a:r>
-              <a:rPr lang="en-US" sz="3000" b="1" dirty="0">
-                <a:solidFill>
-                  <a:schemeClr val="tx1"/>
-                </a:solidFill>
-              </a:rPr>
-              <a:t>Worker</a:t>
-            </a:r>
-          </a:p>
-        </p:txBody>
-      </p:sp>
-      <p:sp>
-        <p:nvSpPr>
-          <p:cNvPr id="8" name="Rechteck 7">
-            <a:extLst>
-              <a:ext uri="{FF2B5EF4-FFF2-40B4-BE49-F238E27FC236}">
-                <a16:creationId xmlns:a16="http://schemas.microsoft.com/office/drawing/2014/main" id="{A624305E-2535-4145-80E0-E967FD4FC6F1}"/>
-              </a:ext>
-            </a:extLst>
-          </p:cNvPr>
-          <p:cNvSpPr/>
-          <p:nvPr/>
-        </p:nvSpPr>
-        <p:spPr>
-          <a:xfrm>
-            <a:off x="3474182" y="4404369"/>
-            <a:ext cx="1991834" cy="787479"/>
-          </a:xfrm>
-          <a:prstGeom prst="rect">
-            <a:avLst/>
-          </a:prstGeom>
-          <a:solidFill>
-            <a:schemeClr val="bg1"/>
-          </a:solidFill>
-          <a:ln w="50800">
-            <a:solidFill>
-              <a:schemeClr val="tx1"/>
-            </a:solidFill>
-          </a:ln>
-        </p:spPr>
-        <p:style>
-          <a:lnRef idx="2">
-            <a:schemeClr val="accent1">
-              <a:shade val="50000"/>
-            </a:schemeClr>
-          </a:lnRef>
-          <a:fillRef idx="1">
-            <a:schemeClr val="accent1"/>
-          </a:fillRef>
-          <a:effectRef idx="0">
-            <a:schemeClr val="accent1"/>
-          </a:effectRef>
-          <a:fontRef idx="minor">
-            <a:schemeClr val="lt1"/>
-          </a:fontRef>
-        </p:style>
-        <p:txBody>
-          <a:bodyPr rtlCol="0" anchor="ctr"/>
-          <a:lstStyle/>
-          <a:p>
-            <a:pPr algn="ctr"/>
-            <a:r>
-              <a:rPr lang="en-US" sz="3000" b="1" dirty="0">
-                <a:solidFill>
-                  <a:schemeClr val="tx1"/>
-                </a:solidFill>
-              </a:rPr>
-              <a:t>Worker</a:t>
-            </a:r>
-          </a:p>
-        </p:txBody>
-      </p:sp>
-      <p:sp>
-        <p:nvSpPr>
-          <p:cNvPr id="11" name="Ellipse 10">
-            <a:extLst>
-              <a:ext uri="{FF2B5EF4-FFF2-40B4-BE49-F238E27FC236}">
-                <a16:creationId xmlns:a16="http://schemas.microsoft.com/office/drawing/2014/main" id="{5AD7F7F9-8D32-4161-BA33-C551305F4F45}"/>
-              </a:ext>
-            </a:extLst>
-          </p:cNvPr>
-          <p:cNvSpPr/>
-          <p:nvPr/>
-        </p:nvSpPr>
-        <p:spPr>
-          <a:xfrm>
-            <a:off x="3411273" y="5829302"/>
-            <a:ext cx="2117653" cy="587446"/>
-          </a:xfrm>
-          <a:prstGeom prst="ellipse">
-            <a:avLst/>
-          </a:prstGeom>
-          <a:solidFill>
-            <a:schemeClr val="bg1"/>
-          </a:solidFill>
-          <a:ln w="50800">
-            <a:solidFill>
-              <a:schemeClr val="tx1"/>
-            </a:solidFill>
-          </a:ln>
-        </p:spPr>
-        <p:style>
-          <a:lnRef idx="2">
-            <a:schemeClr val="accent1">
-              <a:shade val="50000"/>
-            </a:schemeClr>
-          </a:lnRef>
-          <a:fillRef idx="1">
-            <a:schemeClr val="accent1"/>
-          </a:fillRef>
-          <a:effectRef idx="0">
-            <a:schemeClr val="accent1"/>
-          </a:effectRef>
-          <a:fontRef idx="minor">
-            <a:schemeClr val="lt1"/>
-          </a:fontRef>
-        </p:style>
-        <p:txBody>
-          <a:bodyPr rtlCol="0" anchor="ctr"/>
-          <a:lstStyle/>
-          <a:p>
-            <a:pPr algn="ctr"/>
-            <a:r>
-              <a:rPr lang="en-US" sz="3000" b="1" dirty="0">
-                <a:solidFill>
-                  <a:schemeClr val="tx1"/>
-                </a:solidFill>
-              </a:rPr>
-              <a:t>SUT</a:t>
-            </a:r>
-          </a:p>
-        </p:txBody>
-      </p:sp>
-      <p:cxnSp>
-        <p:nvCxnSpPr>
-          <p:cNvPr id="17" name="Gerade Verbindung mit Pfeil 16">
-            <a:extLst>
-              <a:ext uri="{FF2B5EF4-FFF2-40B4-BE49-F238E27FC236}">
-                <a16:creationId xmlns:a16="http://schemas.microsoft.com/office/drawing/2014/main" id="{454A54FF-872A-4CE6-94A4-B8FE578663A1}"/>
-              </a:ext>
-            </a:extLst>
-          </p:cNvPr>
-          <p:cNvCxnSpPr>
-            <a:cxnSpLocks/>
-            <a:stCxn id="8" idx="0"/>
-            <a:endCxn id="24" idx="2"/>
-          </p:cNvCxnSpPr>
-          <p:nvPr/>
-        </p:nvCxnSpPr>
-        <p:spPr>
-          <a:xfrm rot="16200000" flipV="1">
-            <a:off x="3414457" y="3348727"/>
-            <a:ext cx="824392" cy="1286892"/>
-          </a:xfrm>
-          <a:prstGeom prst="bentConnector3">
-            <a:avLst>
-              <a:gd name="adj1" fmla="val 50000"/>
-            </a:avLst>
-          </a:prstGeom>
-          <a:ln w="50800">
-            <a:solidFill>
-              <a:schemeClr val="tx1"/>
-            </a:solidFill>
-            <a:headEnd type="triangle"/>
-            <a:tailEnd type="triangle"/>
-          </a:ln>
-        </p:spPr>
-        <p:style>
-          <a:lnRef idx="1">
-            <a:schemeClr val="accent1"/>
-          </a:lnRef>
-          <a:fillRef idx="0">
-            <a:schemeClr val="accent1"/>
-          </a:fillRef>
-          <a:effectRef idx="0">
-            <a:schemeClr val="accent1"/>
-          </a:effectRef>
-          <a:fontRef idx="minor">
-            <a:schemeClr val="tx1"/>
-          </a:fontRef>
-        </p:style>
-      </p:cxnSp>
-      <p:cxnSp>
-        <p:nvCxnSpPr>
-          <p:cNvPr id="20" name="Gerade Verbindung mit Pfeil 19">
-            <a:extLst>
-              <a:ext uri="{FF2B5EF4-FFF2-40B4-BE49-F238E27FC236}">
-                <a16:creationId xmlns:a16="http://schemas.microsoft.com/office/drawing/2014/main" id="{00FADB33-6E61-40A3-ABE4-65C779C9F5DD}"/>
-              </a:ext>
-            </a:extLst>
-          </p:cNvPr>
-          <p:cNvCxnSpPr>
-            <a:cxnSpLocks/>
-          </p:cNvCxnSpPr>
-          <p:nvPr/>
-        </p:nvCxnSpPr>
-        <p:spPr>
-          <a:xfrm flipH="1" flipV="1">
-            <a:off x="4470099" y="5191848"/>
-            <a:ext cx="1" cy="637454"/>
-          </a:xfrm>
-          <a:prstGeom prst="straightConnector1">
-            <a:avLst/>
-          </a:prstGeom>
-          <a:ln w="50800">
-            <a:solidFill>
-              <a:schemeClr val="tx1"/>
-            </a:solidFill>
-            <a:headEnd type="triangle"/>
-            <a:tailEnd type="triangle"/>
-          </a:ln>
-        </p:spPr>
-        <p:style>
-          <a:lnRef idx="1">
-            <a:schemeClr val="accent1"/>
-          </a:lnRef>
-          <a:fillRef idx="0">
-            <a:schemeClr val="accent1"/>
-          </a:fillRef>
-          <a:effectRef idx="0">
-            <a:schemeClr val="accent1"/>
-          </a:effectRef>
-          <a:fontRef idx="minor">
-            <a:schemeClr val="tx1"/>
-          </a:fontRef>
-        </p:style>
-      </p:cxnSp>
-      <p:cxnSp>
-        <p:nvCxnSpPr>
-          <p:cNvPr id="23" name="Gerade Verbindung mit Pfeil 22">
-            <a:extLst>
-              <a:ext uri="{FF2B5EF4-FFF2-40B4-BE49-F238E27FC236}">
-                <a16:creationId xmlns:a16="http://schemas.microsoft.com/office/drawing/2014/main" id="{E30EE955-6C3A-4E6C-8AD0-60CDEAC50870}"/>
-              </a:ext>
-            </a:extLst>
-          </p:cNvPr>
-          <p:cNvCxnSpPr>
-            <a:cxnSpLocks/>
-            <a:stCxn id="7" idx="0"/>
-            <a:endCxn id="24" idx="2"/>
-          </p:cNvCxnSpPr>
-          <p:nvPr/>
-        </p:nvCxnSpPr>
-        <p:spPr>
-          <a:xfrm rot="16200000" flipV="1">
-            <a:off x="4687708" y="2075477"/>
-            <a:ext cx="824391" cy="3833392"/>
-          </a:xfrm>
-          <a:prstGeom prst="bentConnector3">
-            <a:avLst>
-              <a:gd name="adj1" fmla="val 50000"/>
-            </a:avLst>
-          </a:prstGeom>
-          <a:ln w="50800">
-            <a:solidFill>
-              <a:schemeClr val="tx1"/>
-            </a:solidFill>
-            <a:headEnd type="triangle"/>
-            <a:tailEnd type="triangle"/>
-          </a:ln>
-        </p:spPr>
-        <p:style>
-          <a:lnRef idx="1">
-            <a:schemeClr val="accent1"/>
-          </a:lnRef>
-          <a:fillRef idx="0">
-            <a:schemeClr val="accent1"/>
-          </a:fillRef>
-          <a:effectRef idx="0">
-            <a:schemeClr val="accent1"/>
-          </a:effectRef>
-          <a:fontRef idx="minor">
-            <a:schemeClr val="tx1"/>
-          </a:fontRef>
-        </p:style>
-      </p:cxnSp>
-      <p:cxnSp>
-        <p:nvCxnSpPr>
-          <p:cNvPr id="28" name="Gerade Verbindung mit Pfeil 22">
-            <a:extLst>
-              <a:ext uri="{FF2B5EF4-FFF2-40B4-BE49-F238E27FC236}">
-                <a16:creationId xmlns:a16="http://schemas.microsoft.com/office/drawing/2014/main" id="{F543CDAC-54DD-4AD1-906D-DCEFBF3CC233}"/>
-              </a:ext>
-            </a:extLst>
-          </p:cNvPr>
-          <p:cNvCxnSpPr>
-            <a:cxnSpLocks/>
-            <a:stCxn id="6" idx="0"/>
-            <a:endCxn id="24" idx="2"/>
-          </p:cNvCxnSpPr>
-          <p:nvPr/>
-        </p:nvCxnSpPr>
-        <p:spPr>
-          <a:xfrm rot="5400000" flipH="1" flipV="1">
-            <a:off x="2141208" y="3362369"/>
-            <a:ext cx="824391" cy="1259608"/>
-          </a:xfrm>
-          <a:prstGeom prst="bentConnector3">
-            <a:avLst>
-              <a:gd name="adj1" fmla="val 50000"/>
-            </a:avLst>
-          </a:prstGeom>
-          <a:ln w="50800">
-            <a:solidFill>
-              <a:schemeClr val="tx1"/>
-            </a:solidFill>
-            <a:headEnd type="triangle"/>
-            <a:tailEnd type="triangle"/>
-          </a:ln>
-        </p:spPr>
-        <p:style>
-          <a:lnRef idx="1">
-            <a:schemeClr val="accent1"/>
-          </a:lnRef>
-          <a:fillRef idx="0">
-            <a:schemeClr val="accent1"/>
-          </a:fillRef>
-          <a:effectRef idx="0">
-            <a:schemeClr val="accent1"/>
-          </a:effectRef>
-          <a:fontRef idx="minor">
-            <a:schemeClr val="tx1"/>
-          </a:fontRef>
-        </p:style>
-      </p:cxnSp>
-      <p:cxnSp>
-        <p:nvCxnSpPr>
-          <p:cNvPr id="31" name="Gerade Verbindung mit Pfeil 22">
-            <a:extLst>
-              <a:ext uri="{FF2B5EF4-FFF2-40B4-BE49-F238E27FC236}">
-                <a16:creationId xmlns:a16="http://schemas.microsoft.com/office/drawing/2014/main" id="{CC97DD0C-B8E3-4592-B3F8-E9FAF6164706}"/>
-              </a:ext>
-            </a:extLst>
-          </p:cNvPr>
-          <p:cNvCxnSpPr>
-            <a:cxnSpLocks/>
-            <a:stCxn id="6" idx="2"/>
-            <a:endCxn id="11" idx="2"/>
-          </p:cNvCxnSpPr>
-          <p:nvPr/>
-        </p:nvCxnSpPr>
-        <p:spPr>
-          <a:xfrm rot="16200000" flipH="1">
-            <a:off x="2201847" y="4913599"/>
-            <a:ext cx="931178" cy="1487674"/>
-          </a:xfrm>
-          <a:prstGeom prst="bentConnector2">
-            <a:avLst/>
-          </a:prstGeom>
-          <a:ln w="50800">
-            <a:solidFill>
-              <a:schemeClr val="tx1"/>
-            </a:solidFill>
-            <a:headEnd type="triangle"/>
-            <a:tailEnd type="triangle"/>
-          </a:ln>
-        </p:spPr>
-        <p:style>
-          <a:lnRef idx="1">
-            <a:schemeClr val="accent1"/>
-          </a:lnRef>
-          <a:fillRef idx="0">
-            <a:schemeClr val="accent1"/>
-          </a:fillRef>
-          <a:effectRef idx="0">
-            <a:schemeClr val="accent1"/>
-          </a:effectRef>
-          <a:fontRef idx="minor">
-            <a:schemeClr val="tx1"/>
-          </a:fontRef>
-        </p:style>
-      </p:cxnSp>
-      <p:cxnSp>
-        <p:nvCxnSpPr>
-          <p:cNvPr id="34" name="Gerade Verbindung mit Pfeil 22">
-            <a:extLst>
-              <a:ext uri="{FF2B5EF4-FFF2-40B4-BE49-F238E27FC236}">
-                <a16:creationId xmlns:a16="http://schemas.microsoft.com/office/drawing/2014/main" id="{4D524FB7-EDEC-4DFA-88FE-41B2F713C964}"/>
-              </a:ext>
-            </a:extLst>
-          </p:cNvPr>
-          <p:cNvCxnSpPr>
-            <a:cxnSpLocks/>
-            <a:stCxn id="7" idx="2"/>
-            <a:endCxn id="11" idx="6"/>
-          </p:cNvCxnSpPr>
-          <p:nvPr/>
-        </p:nvCxnSpPr>
-        <p:spPr>
-          <a:xfrm rot="5400000">
-            <a:off x="5807174" y="4913600"/>
-            <a:ext cx="931178" cy="1487673"/>
-          </a:xfrm>
-          <a:prstGeom prst="bentConnector2">
-            <a:avLst/>
-          </a:prstGeom>
-          <a:ln w="50800">
-            <a:solidFill>
-              <a:schemeClr val="tx1"/>
-            </a:solidFill>
-            <a:headEnd type="triangle"/>
-            <a:tailEnd type="triangle"/>
-          </a:ln>
-        </p:spPr>
-        <p:style>
-          <a:lnRef idx="1">
-            <a:schemeClr val="accent1"/>
-          </a:lnRef>
-          <a:fillRef idx="0">
-            <a:schemeClr val="accent1"/>
-          </a:fillRef>
-          <a:effectRef idx="0">
-            <a:schemeClr val="accent1"/>
-          </a:effectRef>
-          <a:fontRef idx="minor">
-            <a:schemeClr val="tx1"/>
-          </a:fontRef>
-        </p:style>
-      </p:cxnSp>
-      <p:sp>
-        <p:nvSpPr>
-          <p:cNvPr id="38" name="Rechteck: abgerundete Ecken 37">
-            <a:extLst>
-              <a:ext uri="{FF2B5EF4-FFF2-40B4-BE49-F238E27FC236}">
-                <a16:creationId xmlns:a16="http://schemas.microsoft.com/office/drawing/2014/main" id="{D4EB0EBB-8DBA-4D6B-8254-CBDA1D749562}"/>
-              </a:ext>
-            </a:extLst>
-          </p:cNvPr>
-          <p:cNvSpPr/>
-          <p:nvPr/>
-        </p:nvSpPr>
-        <p:spPr>
-          <a:xfrm>
-            <a:off x="446562" y="321734"/>
-            <a:ext cx="8038214" cy="5132768"/>
-          </a:xfrm>
-          <a:prstGeom prst="roundRect">
-            <a:avLst/>
-          </a:prstGeom>
-          <a:noFill/>
-          <a:ln w="25400">
-            <a:solidFill>
-              <a:schemeClr val="tx1"/>
-            </a:solidFill>
-            <a:prstDash val="sysDash"/>
-          </a:ln>
-        </p:spPr>
-        <p:style>
-          <a:lnRef idx="2">
-            <a:schemeClr val="accent1">
-              <a:shade val="50000"/>
-            </a:schemeClr>
-          </a:lnRef>
-          <a:fillRef idx="1">
-            <a:schemeClr val="accent1"/>
-          </a:fillRef>
-          <a:effectRef idx="0">
-            <a:schemeClr val="accent1"/>
-          </a:effectRef>
-          <a:fontRef idx="minor">
-            <a:schemeClr val="lt1"/>
-          </a:fontRef>
-        </p:style>
-        <p:txBody>
-          <a:bodyPr rtlCol="0" anchor="ctr"/>
-          <a:lstStyle/>
-          <a:p>
-            <a:pPr algn="ctr"/>
-            <a:endParaRPr lang="en-US"/>
-          </a:p>
-        </p:txBody>
-      </p:sp>
-      <p:sp>
-        <p:nvSpPr>
-          <p:cNvPr id="100" name="Rechteck: abgerundete Ecken 99">
-            <a:extLst>
-              <a:ext uri="{FF2B5EF4-FFF2-40B4-BE49-F238E27FC236}">
-                <a16:creationId xmlns:a16="http://schemas.microsoft.com/office/drawing/2014/main" id="{DB6EBB3B-50FF-46D6-B369-7D7E75F07AEC}"/>
-              </a:ext>
-            </a:extLst>
-          </p:cNvPr>
-          <p:cNvSpPr/>
-          <p:nvPr/>
-        </p:nvSpPr>
-        <p:spPr>
-          <a:xfrm>
-            <a:off x="446562" y="5571120"/>
-            <a:ext cx="8038214" cy="1045661"/>
-          </a:xfrm>
-          <a:prstGeom prst="roundRect">
-            <a:avLst/>
-          </a:prstGeom>
-          <a:noFill/>
-          <a:ln w="25400">
-            <a:solidFill>
-              <a:schemeClr val="tx1"/>
-            </a:solidFill>
-            <a:prstDash val="sysDash"/>
-          </a:ln>
-        </p:spPr>
-        <p:style>
-          <a:lnRef idx="2">
-            <a:schemeClr val="accent1">
-              <a:shade val="50000"/>
-            </a:schemeClr>
-          </a:lnRef>
-          <a:fillRef idx="1">
-            <a:schemeClr val="accent1"/>
-          </a:fillRef>
-          <a:effectRef idx="0">
-            <a:schemeClr val="accent1"/>
-          </a:effectRef>
-          <a:fontRef idx="minor">
-            <a:schemeClr val="lt1"/>
-          </a:fontRef>
-        </p:style>
-        <p:txBody>
-          <a:bodyPr rtlCol="0" anchor="ctr"/>
-          <a:lstStyle/>
-          <a:p>
-            <a:pPr algn="ctr"/>
-            <a:endParaRPr lang="en-US"/>
-          </a:p>
-        </p:txBody>
-      </p:sp>
-      <p:sp>
-        <p:nvSpPr>
-          <p:cNvPr id="103" name="Textfeld 102">
-            <a:extLst>
-              <a:ext uri="{FF2B5EF4-FFF2-40B4-BE49-F238E27FC236}">
-                <a16:creationId xmlns:a16="http://schemas.microsoft.com/office/drawing/2014/main" id="{4F6641FC-13AE-41F6-B5CE-F9FC1B6E4043}"/>
-              </a:ext>
-            </a:extLst>
-          </p:cNvPr>
-          <p:cNvSpPr txBox="1"/>
-          <p:nvPr/>
-        </p:nvSpPr>
-        <p:spPr>
-          <a:xfrm>
-            <a:off x="8582234" y="5454501"/>
-            <a:ext cx="2698910" cy="646331"/>
-          </a:xfrm>
-          <a:prstGeom prst="rect">
-            <a:avLst/>
-          </a:prstGeom>
-          <a:noFill/>
-        </p:spPr>
-        <p:txBody>
-          <a:bodyPr wrap="square" rtlCol="0">
-            <a:spAutoFit/>
-          </a:bodyPr>
-          <a:lstStyle/>
-          <a:p>
-            <a:r>
-              <a:rPr lang="en-US" dirty="0"/>
-              <a:t>SUT and </a:t>
-            </a:r>
-            <a:r>
-              <a:rPr lang="en-US" dirty="0" err="1"/>
-              <a:t>openISBT</a:t>
-            </a:r>
-            <a:r>
-              <a:rPr lang="en-US" dirty="0"/>
-              <a:t> should run on different instances.</a:t>
-            </a:r>
-          </a:p>
-        </p:txBody>
-      </p:sp>
-      <p:sp>
-        <p:nvSpPr>
-          <p:cNvPr id="104" name="Textfeld 103">
-            <a:extLst>
-              <a:ext uri="{FF2B5EF4-FFF2-40B4-BE49-F238E27FC236}">
-                <a16:creationId xmlns:a16="http://schemas.microsoft.com/office/drawing/2014/main" id="{F31A7DD7-7C36-4835-A126-0258ABE00C78}"/>
-              </a:ext>
-            </a:extLst>
-          </p:cNvPr>
-          <p:cNvSpPr txBox="1"/>
-          <p:nvPr/>
-        </p:nvSpPr>
-        <p:spPr>
-          <a:xfrm>
-            <a:off x="8567181" y="4203498"/>
-            <a:ext cx="2235498" cy="646331"/>
-          </a:xfrm>
-          <a:prstGeom prst="rect">
-            <a:avLst/>
-          </a:prstGeom>
-          <a:noFill/>
-        </p:spPr>
-        <p:txBody>
-          <a:bodyPr wrap="square" rtlCol="0">
-            <a:spAutoFit/>
-          </a:bodyPr>
-          <a:lstStyle/>
-          <a:p>
-            <a:r>
-              <a:rPr lang="en-US" dirty="0"/>
-              <a:t>Workers can also run on other instances.</a:t>
-            </a:r>
-          </a:p>
-        </p:txBody>
-      </p:sp>
-      <p:sp>
-        <p:nvSpPr>
-          <p:cNvPr id="106" name="Textfeld 105">
-            <a:extLst>
-              <a:ext uri="{FF2B5EF4-FFF2-40B4-BE49-F238E27FC236}">
-                <a16:creationId xmlns:a16="http://schemas.microsoft.com/office/drawing/2014/main" id="{BFAA0562-8ED9-4357-A728-7D0671E6015C}"/>
-              </a:ext>
-            </a:extLst>
-          </p:cNvPr>
-          <p:cNvSpPr txBox="1"/>
-          <p:nvPr/>
-        </p:nvSpPr>
-        <p:spPr>
-          <a:xfrm>
-            <a:off x="8567181" y="2192837"/>
-            <a:ext cx="2458782" cy="923330"/>
-          </a:xfrm>
-          <a:prstGeom prst="rect">
-            <a:avLst/>
-          </a:prstGeom>
-          <a:noFill/>
-        </p:spPr>
-        <p:txBody>
-          <a:bodyPr wrap="square" rtlCol="0">
-            <a:spAutoFit/>
-          </a:bodyPr>
-          <a:lstStyle/>
-          <a:p>
-            <a:r>
-              <a:rPr lang="en-US" dirty="0"/>
-              <a:t>All </a:t>
-            </a:r>
-            <a:r>
-              <a:rPr lang="en-US" dirty="0" err="1"/>
-              <a:t>openISBT</a:t>
-            </a:r>
-            <a:r>
-              <a:rPr lang="en-US" dirty="0"/>
-              <a:t> tools can and should run on the same instance.</a:t>
-            </a:r>
-          </a:p>
-        </p:txBody>
-      </p:sp>
-      <p:sp>
-        <p:nvSpPr>
-          <p:cNvPr id="22" name="Rechteck 21">
-            <a:extLst>
-              <a:ext uri="{FF2B5EF4-FFF2-40B4-BE49-F238E27FC236}">
-                <a16:creationId xmlns:a16="http://schemas.microsoft.com/office/drawing/2014/main" id="{50033A41-24CC-42AF-8C6C-FB683038588D}"/>
-              </a:ext>
-            </a:extLst>
-          </p:cNvPr>
-          <p:cNvSpPr/>
-          <p:nvPr/>
-        </p:nvSpPr>
-        <p:spPr>
-          <a:xfrm>
-            <a:off x="5024765" y="816185"/>
-            <a:ext cx="1991834" cy="787479"/>
-          </a:xfrm>
-          <a:prstGeom prst="rect">
-            <a:avLst/>
-          </a:prstGeom>
-          <a:solidFill>
-            <a:schemeClr val="bg1"/>
-          </a:solidFill>
-          <a:ln w="50800">
-            <a:solidFill>
-              <a:schemeClr val="tx1"/>
-            </a:solidFill>
-          </a:ln>
-        </p:spPr>
-        <p:style>
-          <a:lnRef idx="2">
-            <a:schemeClr val="accent1">
-              <a:shade val="50000"/>
-            </a:schemeClr>
-          </a:lnRef>
-          <a:fillRef idx="1">
-            <a:schemeClr val="accent1"/>
-          </a:fillRef>
-          <a:effectRef idx="0">
-            <a:schemeClr val="accent1"/>
-          </a:effectRef>
-          <a:fontRef idx="minor">
-            <a:schemeClr val="lt1"/>
-          </a:fontRef>
-        </p:style>
-        <p:txBody>
-          <a:bodyPr rtlCol="0" anchor="ctr"/>
-          <a:lstStyle/>
-          <a:p>
-            <a:pPr algn="ctr"/>
-            <a:r>
-              <a:rPr lang="en-US" sz="2000" b="1" dirty="0">
-                <a:solidFill>
-                  <a:schemeClr val="tx1"/>
-                </a:solidFill>
-              </a:rPr>
-              <a:t>Workload Generator</a:t>
-            </a:r>
-          </a:p>
-        </p:txBody>
-      </p:sp>
-      <p:sp>
-        <p:nvSpPr>
-          <p:cNvPr id="24" name="Rechteck 23">
-            <a:extLst>
-              <a:ext uri="{FF2B5EF4-FFF2-40B4-BE49-F238E27FC236}">
-                <a16:creationId xmlns:a16="http://schemas.microsoft.com/office/drawing/2014/main" id="{B73AC2A5-499C-4EF4-82D7-74C2C452A0F1}"/>
-              </a:ext>
-            </a:extLst>
-          </p:cNvPr>
-          <p:cNvSpPr/>
-          <p:nvPr/>
-        </p:nvSpPr>
-        <p:spPr>
-          <a:xfrm>
-            <a:off x="2187290" y="2792498"/>
-            <a:ext cx="1991834" cy="787479"/>
-          </a:xfrm>
-          <a:prstGeom prst="rect">
-            <a:avLst/>
-          </a:prstGeom>
-          <a:solidFill>
-            <a:schemeClr val="bg1"/>
-          </a:solidFill>
-          <a:ln w="50800">
-            <a:solidFill>
-              <a:schemeClr val="tx1"/>
-            </a:solidFill>
-          </a:ln>
-        </p:spPr>
-        <p:style>
-          <a:lnRef idx="2">
-            <a:schemeClr val="accent1">
-              <a:shade val="50000"/>
-            </a:schemeClr>
-          </a:lnRef>
-          <a:fillRef idx="1">
-            <a:schemeClr val="accent1"/>
-          </a:fillRef>
-          <a:effectRef idx="0">
-            <a:schemeClr val="accent1"/>
-          </a:effectRef>
-          <a:fontRef idx="minor">
-            <a:schemeClr val="lt1"/>
-          </a:fontRef>
-        </p:style>
-        <p:txBody>
-          <a:bodyPr rtlCol="0" anchor="ctr"/>
-          <a:lstStyle/>
-          <a:p>
-            <a:pPr algn="ctr"/>
-            <a:r>
-              <a:rPr lang="en-US" sz="2000" b="1" dirty="0">
-                <a:solidFill>
-                  <a:schemeClr val="tx1"/>
-                </a:solidFill>
-              </a:rPr>
-              <a:t>Run Tool</a:t>
-            </a:r>
-          </a:p>
-        </p:txBody>
-      </p:sp>
-      <p:sp>
-        <p:nvSpPr>
-          <p:cNvPr id="25" name="Rechteck 24">
-            <a:extLst>
-              <a:ext uri="{FF2B5EF4-FFF2-40B4-BE49-F238E27FC236}">
-                <a16:creationId xmlns:a16="http://schemas.microsoft.com/office/drawing/2014/main" id="{CAAAB417-F116-420A-ABE5-8C3CA447E95F}"/>
-              </a:ext>
-            </a:extLst>
-          </p:cNvPr>
-          <p:cNvSpPr/>
-          <p:nvPr/>
-        </p:nvSpPr>
-        <p:spPr>
-          <a:xfrm>
-            <a:off x="5024765" y="2792498"/>
-            <a:ext cx="1991834" cy="787479"/>
-          </a:xfrm>
-          <a:prstGeom prst="rect">
-            <a:avLst/>
-          </a:prstGeom>
-          <a:solidFill>
-            <a:schemeClr val="bg1"/>
-          </a:solidFill>
-          <a:ln w="50800">
-            <a:solidFill>
-              <a:schemeClr val="tx1"/>
-            </a:solidFill>
-          </a:ln>
-        </p:spPr>
-        <p:style>
-          <a:lnRef idx="2">
-            <a:schemeClr val="accent1">
-              <a:shade val="50000"/>
-            </a:schemeClr>
-          </a:lnRef>
-          <a:fillRef idx="1">
-            <a:schemeClr val="accent1"/>
-          </a:fillRef>
-          <a:effectRef idx="0">
-            <a:schemeClr val="accent1"/>
-          </a:effectRef>
-          <a:fontRef idx="minor">
-            <a:schemeClr val="lt1"/>
-          </a:fontRef>
-        </p:style>
-        <p:txBody>
-          <a:bodyPr rtlCol="0" anchor="ctr"/>
-          <a:lstStyle/>
-          <a:p>
-            <a:pPr algn="ctr"/>
-            <a:r>
               <a:rPr lang="en-US" sz="2000" b="1" dirty="0">
                 <a:solidFill>
                   <a:schemeClr val="tx1"/>
@@ -5416,8 +4367,8 @@
         </p:nvSpPr>
         <p:spPr>
           <a:xfrm>
-            <a:off x="701275" y="757997"/>
-            <a:ext cx="1537175" cy="461665"/>
+            <a:off x="553673" y="581828"/>
+            <a:ext cx="1684777" cy="646331"/>
           </a:xfrm>
           <a:prstGeom prst="rect">
             <a:avLst/>
@@ -5436,14 +4387,21 @@
             </a:r>
             <a:r>
               <a:rPr lang="en-US" sz="1200" dirty="0"/>
-              <a:t> specification</a:t>
+              <a:t> specification(s)</a:t>
             </a:r>
             <a:br>
               <a:rPr lang="en-US" sz="1200" dirty="0"/>
             </a:br>
             <a:r>
               <a:rPr lang="en-US" sz="1200" dirty="0"/>
-              <a:t>Pattern definition</a:t>
+              <a:t>service links</a:t>
+            </a:r>
+            <a:br>
+              <a:rPr lang="en-US" sz="1200" dirty="0"/>
+            </a:br>
+            <a:r>
+              <a:rPr lang="en-US" sz="1200" dirty="0"/>
+              <a:t>pattern definition</a:t>
             </a:r>
           </a:p>
         </p:txBody>
@@ -5607,14 +4565,14 @@
           <p:cNvCxnSpPr>
             <a:cxnSpLocks/>
             <a:stCxn id="4" idx="3"/>
-            <a:endCxn id="22" idx="1"/>
+            <a:endCxn id="39" idx="1"/>
           </p:cNvCxnSpPr>
           <p:nvPr/>
         </p:nvCxnSpPr>
         <p:spPr>
           <a:xfrm>
             <a:off x="4179124" y="1203857"/>
-            <a:ext cx="845641" cy="6068"/>
+            <a:ext cx="845641" cy="0"/>
           </a:xfrm>
           <a:prstGeom prst="straightConnector1">
             <a:avLst/>
@@ -5648,21 +4606,20 @@
             </a:extLst>
           </p:cNvPr>
           <p:cNvCxnSpPr>
-            <a:stCxn id="22" idx="3"/>
+            <a:cxnSpLocks/>
+            <a:stCxn id="22" idx="1"/>
             <a:endCxn id="24" idx="1"/>
           </p:cNvCxnSpPr>
           <p:nvPr/>
         </p:nvCxnSpPr>
         <p:spPr>
-          <a:xfrm flipH="1">
-            <a:off x="2187290" y="1209925"/>
-            <a:ext cx="4829309" cy="1976313"/>
-          </a:xfrm>
-          <a:prstGeom prst="bentConnector5">
+          <a:xfrm rot="10800000" flipV="1">
+            <a:off x="2187291" y="2178844"/>
+            <a:ext cx="1411367" cy="1007394"/>
+          </a:xfrm>
+          <a:prstGeom prst="bentConnector3">
             <a:avLst>
-              <a:gd name="adj1" fmla="val -4734"/>
-              <a:gd name="adj2" fmla="val 50000"/>
-              <a:gd name="adj3" fmla="val 104734"/>
+              <a:gd name="adj1" fmla="val 116197"/>
             </a:avLst>
           </a:prstGeom>
           <a:ln w="19050">
@@ -5802,6 +4759,188 @@
               <a:t>boxPlotValues</a:t>
             </a:r>
             <a:endParaRPr lang="en-US" sz="1200" dirty="0"/>
+          </a:p>
+        </p:txBody>
+      </p:sp>
+      <p:sp>
+        <p:nvSpPr>
+          <p:cNvPr id="39" name="Rechteck 38">
+            <a:extLst>
+              <a:ext uri="{FF2B5EF4-FFF2-40B4-BE49-F238E27FC236}">
+                <a16:creationId xmlns:a16="http://schemas.microsoft.com/office/drawing/2014/main" id="{D83BA9F0-1110-4FFB-AF6C-54A89CE737C3}"/>
+              </a:ext>
+            </a:extLst>
+          </p:cNvPr>
+          <p:cNvSpPr/>
+          <p:nvPr/>
+        </p:nvSpPr>
+        <p:spPr>
+          <a:xfrm>
+            <a:off x="5024765" y="810117"/>
+            <a:ext cx="1991834" cy="787479"/>
+          </a:xfrm>
+          <a:prstGeom prst="rect">
+            <a:avLst/>
+          </a:prstGeom>
+          <a:solidFill>
+            <a:schemeClr val="bg1"/>
+          </a:solidFill>
+          <a:ln w="50800">
+            <a:solidFill>
+              <a:schemeClr val="tx1"/>
+            </a:solidFill>
+          </a:ln>
+        </p:spPr>
+        <p:style>
+          <a:lnRef idx="2">
+            <a:schemeClr val="accent1">
+              <a:shade val="50000"/>
+            </a:schemeClr>
+          </a:lnRef>
+          <a:fillRef idx="1">
+            <a:schemeClr val="accent1"/>
+          </a:fillRef>
+          <a:effectRef idx="0">
+            <a:schemeClr val="accent1"/>
+          </a:effectRef>
+          <a:fontRef idx="minor">
+            <a:schemeClr val="lt1"/>
+          </a:fontRef>
+        </p:style>
+        <p:txBody>
+          <a:bodyPr rtlCol="0" anchor="ctr"/>
+          <a:lstStyle/>
+          <a:p>
+            <a:pPr algn="ctr"/>
+            <a:r>
+              <a:rPr lang="en-US" sz="2000" b="1" dirty="0">
+                <a:solidFill>
+                  <a:schemeClr val="tx1"/>
+                </a:solidFill>
+              </a:rPr>
+              <a:t>(opt.) Request Distribution</a:t>
+            </a:r>
+          </a:p>
+        </p:txBody>
+      </p:sp>
+      <p:cxnSp>
+        <p:nvCxnSpPr>
+          <p:cNvPr id="40" name="Gerade Verbindung mit Pfeil 39">
+            <a:extLst>
+              <a:ext uri="{FF2B5EF4-FFF2-40B4-BE49-F238E27FC236}">
+                <a16:creationId xmlns:a16="http://schemas.microsoft.com/office/drawing/2014/main" id="{09BDFAA6-4CA4-40C9-82B6-BE79223E612B}"/>
+              </a:ext>
+            </a:extLst>
+          </p:cNvPr>
+          <p:cNvCxnSpPr>
+            <a:cxnSpLocks/>
+            <a:stCxn id="4" idx="3"/>
+            <a:endCxn id="22" idx="0"/>
+          </p:cNvCxnSpPr>
+          <p:nvPr/>
+        </p:nvCxnSpPr>
+        <p:spPr>
+          <a:xfrm>
+            <a:off x="4179124" y="1203857"/>
+            <a:ext cx="415450" cy="581247"/>
+          </a:xfrm>
+          <a:prstGeom prst="bentConnector2">
+            <a:avLst/>
+          </a:prstGeom>
+          <a:ln w="19050">
+            <a:tailEnd type="triangle"/>
+          </a:ln>
+        </p:spPr>
+        <p:style>
+          <a:lnRef idx="1">
+            <a:schemeClr val="dk1"/>
+          </a:lnRef>
+          <a:fillRef idx="0">
+            <a:schemeClr val="dk1"/>
+          </a:fillRef>
+          <a:effectRef idx="0">
+            <a:schemeClr val="dk1"/>
+          </a:effectRef>
+          <a:fontRef idx="minor">
+            <a:schemeClr val="tx1"/>
+          </a:fontRef>
+        </p:style>
+      </p:cxnSp>
+      <p:cxnSp>
+        <p:nvCxnSpPr>
+          <p:cNvPr id="42" name="Gerade Verbindung mit Pfeil 39">
+            <a:extLst>
+              <a:ext uri="{FF2B5EF4-FFF2-40B4-BE49-F238E27FC236}">
+                <a16:creationId xmlns:a16="http://schemas.microsoft.com/office/drawing/2014/main" id="{E799B7F4-EB42-4EE6-A932-DB008B1A645B}"/>
+              </a:ext>
+            </a:extLst>
+          </p:cNvPr>
+          <p:cNvCxnSpPr>
+            <a:cxnSpLocks/>
+            <a:stCxn id="39" idx="2"/>
+            <a:endCxn id="22" idx="3"/>
+          </p:cNvCxnSpPr>
+          <p:nvPr/>
+        </p:nvCxnSpPr>
+        <p:spPr>
+          <a:xfrm rot="5400000">
+            <a:off x="5514963" y="1673125"/>
+            <a:ext cx="581248" cy="430191"/>
+          </a:xfrm>
+          <a:prstGeom prst="bentConnector2">
+            <a:avLst/>
+          </a:prstGeom>
+          <a:ln w="19050">
+            <a:tailEnd type="triangle"/>
+          </a:ln>
+        </p:spPr>
+        <p:style>
+          <a:lnRef idx="1">
+            <a:schemeClr val="dk1"/>
+          </a:lnRef>
+          <a:fillRef idx="0">
+            <a:schemeClr val="dk1"/>
+          </a:fillRef>
+          <a:effectRef idx="0">
+            <a:schemeClr val="dk1"/>
+          </a:effectRef>
+          <a:fontRef idx="minor">
+            <a:schemeClr val="tx1"/>
+          </a:fontRef>
+        </p:style>
+      </p:cxnSp>
+      <p:sp>
+        <p:nvSpPr>
+          <p:cNvPr id="45" name="Textfeld 44">
+            <a:extLst>
+              <a:ext uri="{FF2B5EF4-FFF2-40B4-BE49-F238E27FC236}">
+                <a16:creationId xmlns:a16="http://schemas.microsoft.com/office/drawing/2014/main" id="{76A225BE-5732-4772-BA69-50893F8E6D09}"/>
+              </a:ext>
+            </a:extLst>
+          </p:cNvPr>
+          <p:cNvSpPr txBox="1"/>
+          <p:nvPr/>
+        </p:nvSpPr>
+        <p:spPr>
+          <a:xfrm>
+            <a:off x="6020682" y="1779656"/>
+            <a:ext cx="880172" cy="461665"/>
+          </a:xfrm>
+          <a:prstGeom prst="rect">
+            <a:avLst/>
+          </a:prstGeom>
+          <a:noFill/>
+        </p:spPr>
+        <p:txBody>
+          <a:bodyPr wrap="square" rtlCol="0">
+            <a:spAutoFit/>
+          </a:bodyPr>
+          <a:lstStyle/>
+          <a:p>
+            <a:r>
+              <a:rPr lang="en-US" sz="1200" dirty="0"/>
+              <a:t>adjusted mapping</a:t>
+            </a:r>
           </a:p>
         </p:txBody>
       </p:sp>

</xml_diff>